<commit_message>
voeg de exel voor de taak 50% toe
</commit_message>
<xml_diff>
--- a/school/afiche.pptx
+++ b/school/afiche.pptx
@@ -115,7 +115,7 @@
 <file path=ppt/revisionInfo.xml><?xml version="1.0" encoding="utf-8"?>
 <p1510:revInfo xmlns:a="http://schemas.openxmlformats.org/drawingml/2006/main" xmlns:r="http://schemas.openxmlformats.org/officeDocument/2006/relationships" xmlns:p1510="http://schemas.microsoft.com/office/powerpoint/2015/10/main">
   <p1510:revLst>
-    <p1510:client id="{5D434D30-F688-4623-B10D-9AE1AB3633DC}" v="36" dt="2025-03-10T12:18:11.878"/>
+    <p1510:client id="{5D434D30-F688-4623-B10D-9AE1AB3633DC}" v="37" dt="2025-03-11T07:32:40.822"/>
     <p1510:client id="{E35881AE-9567-4434-882A-640E432DFEFF}" v="96" dt="2025-03-10T17:58:00.873"/>
   </p1510:revLst>
 </p1510:revInfo>
@@ -126,12 +126,12 @@
   <pc:docChgLst>
     <pc:chgData name="Debakker Stan" userId="dcaf6aa6-4ff3-4b00-8b67-253531728245" providerId="ADAL" clId="{5D434D30-F688-4623-B10D-9AE1AB3633DC}"/>
     <pc:docChg chg="undo custSel addSld modSld modMainMaster">
-      <pc:chgData name="Debakker Stan" userId="dcaf6aa6-4ff3-4b00-8b67-253531728245" providerId="ADAL" clId="{5D434D30-F688-4623-B10D-9AE1AB3633DC}" dt="2025-03-10T15:26:09.312" v="263" actId="1076"/>
+      <pc:chgData name="Debakker Stan" userId="dcaf6aa6-4ff3-4b00-8b67-253531728245" providerId="ADAL" clId="{5D434D30-F688-4623-B10D-9AE1AB3633DC}" dt="2025-03-11T07:34:12.106" v="271" actId="478"/>
       <pc:docMkLst>
         <pc:docMk/>
       </pc:docMkLst>
       <pc:sldChg chg="addSp delSp modSp new mod">
-        <pc:chgData name="Debakker Stan" userId="dcaf6aa6-4ff3-4b00-8b67-253531728245" providerId="ADAL" clId="{5D434D30-F688-4623-B10D-9AE1AB3633DC}" dt="2025-03-10T15:26:09.312" v="263" actId="1076"/>
+        <pc:chgData name="Debakker Stan" userId="dcaf6aa6-4ff3-4b00-8b67-253531728245" providerId="ADAL" clId="{5D434D30-F688-4623-B10D-9AE1AB3633DC}" dt="2025-03-11T07:34:12.106" v="271" actId="478"/>
         <pc:sldMkLst>
           <pc:docMk/>
           <pc:sldMk cId="428378912" sldId="256"/>
@@ -185,6 +185,14 @@
           </ac:picMkLst>
         </pc:picChg>
         <pc:picChg chg="add del mod">
+          <ac:chgData name="Debakker Stan" userId="dcaf6aa6-4ff3-4b00-8b67-253531728245" providerId="ADAL" clId="{5D434D30-F688-4623-B10D-9AE1AB3633DC}" dt="2025-03-11T07:34:12.106" v="271" actId="478"/>
+          <ac:picMkLst>
+            <pc:docMk/>
+            <pc:sldMk cId="428378912" sldId="256"/>
+            <ac:picMk id="5" creationId="{67544987-F41B-82DC-1679-6C0E2FE1878B}"/>
+          </ac:picMkLst>
+        </pc:picChg>
+        <pc:picChg chg="add del mod">
           <ac:chgData name="Debakker Stan" userId="dcaf6aa6-4ff3-4b00-8b67-253531728245" providerId="ADAL" clId="{5D434D30-F688-4623-B10D-9AE1AB3633DC}" dt="2025-03-10T11:50:30.332" v="161" actId="478"/>
           <ac:picMkLst>
             <pc:docMk/>
@@ -201,7 +209,7 @@
           </ac:picMkLst>
         </pc:picChg>
         <pc:picChg chg="add mod">
-          <ac:chgData name="Debakker Stan" userId="dcaf6aa6-4ff3-4b00-8b67-253531728245" providerId="ADAL" clId="{5D434D30-F688-4623-B10D-9AE1AB3633DC}" dt="2025-03-10T12:19:54.124" v="261" actId="1076"/>
+          <ac:chgData name="Debakker Stan" userId="dcaf6aa6-4ff3-4b00-8b67-253531728245" providerId="ADAL" clId="{5D434D30-F688-4623-B10D-9AE1AB3633DC}" dt="2025-03-11T07:33:06.826" v="270" actId="1076"/>
           <ac:picMkLst>
             <pc:docMk/>
             <pc:sldMk cId="428378912" sldId="256"/>
@@ -583,7 +591,7 @@
           <a:p>
             <a:fld id="{C764DE79-268F-4C1A-8933-263129D2AF90}" type="datetimeFigureOut">
               <a:rPr lang="en-US" smtClean="0"/>
-              <a:t>3/10/2025</a:t>
+              <a:t>3/11/2025</a:t>
             </a:fld>
             <a:endParaRPr lang="en-US"/>
           </a:p>
@@ -625,7 +633,7 @@
           <a:p>
             <a:fld id="{48F63A3B-78C7-47BE-AE5E-E10140E04643}" type="slidenum">
               <a:rPr lang="en-US" smtClean="0"/>
-              <a:t>‹#›</a:t>
+              <a:t>‹nr.›</a:t>
             </a:fld>
             <a:endParaRPr lang="en-US"/>
           </a:p>
@@ -753,7 +761,7 @@
           <a:p>
             <a:fld id="{C764DE79-268F-4C1A-8933-263129D2AF90}" type="datetimeFigureOut">
               <a:rPr lang="en-US" smtClean="0"/>
-              <a:t>3/10/2025</a:t>
+              <a:t>3/11/2025</a:t>
             </a:fld>
             <a:endParaRPr lang="en-US"/>
           </a:p>
@@ -795,7 +803,7 @@
           <a:p>
             <a:fld id="{48F63A3B-78C7-47BE-AE5E-E10140E04643}" type="slidenum">
               <a:rPr lang="en-US" smtClean="0"/>
-              <a:t>‹#›</a:t>
+              <a:t>‹nr.›</a:t>
             </a:fld>
             <a:endParaRPr lang="en-US"/>
           </a:p>
@@ -933,7 +941,7 @@
           <a:p>
             <a:fld id="{C764DE79-268F-4C1A-8933-263129D2AF90}" type="datetimeFigureOut">
               <a:rPr lang="en-US" smtClean="0"/>
-              <a:t>3/10/2025</a:t>
+              <a:t>3/11/2025</a:t>
             </a:fld>
             <a:endParaRPr lang="en-US"/>
           </a:p>
@@ -975,7 +983,7 @@
           <a:p>
             <a:fld id="{48F63A3B-78C7-47BE-AE5E-E10140E04643}" type="slidenum">
               <a:rPr lang="en-US" smtClean="0"/>
-              <a:t>‹#›</a:t>
+              <a:t>‹nr.›</a:t>
             </a:fld>
             <a:endParaRPr lang="en-US"/>
           </a:p>
@@ -1103,7 +1111,7 @@
           <a:p>
             <a:fld id="{C764DE79-268F-4C1A-8933-263129D2AF90}" type="datetimeFigureOut">
               <a:rPr lang="en-US" smtClean="0"/>
-              <a:t>3/10/2025</a:t>
+              <a:t>3/11/2025</a:t>
             </a:fld>
             <a:endParaRPr lang="en-US"/>
           </a:p>
@@ -1145,7 +1153,7 @@
           <a:p>
             <a:fld id="{48F63A3B-78C7-47BE-AE5E-E10140E04643}" type="slidenum">
               <a:rPr lang="en-US" smtClean="0"/>
-              <a:t>‹#›</a:t>
+              <a:t>‹nr.›</a:t>
             </a:fld>
             <a:endParaRPr lang="en-US"/>
           </a:p>
@@ -1349,7 +1357,7 @@
           <a:p>
             <a:fld id="{C764DE79-268F-4C1A-8933-263129D2AF90}" type="datetimeFigureOut">
               <a:rPr lang="en-US" smtClean="0"/>
-              <a:t>3/10/2025</a:t>
+              <a:t>3/11/2025</a:t>
             </a:fld>
             <a:endParaRPr lang="en-US"/>
           </a:p>
@@ -1391,7 +1399,7 @@
           <a:p>
             <a:fld id="{48F63A3B-78C7-47BE-AE5E-E10140E04643}" type="slidenum">
               <a:rPr lang="en-US" smtClean="0"/>
-              <a:t>‹#›</a:t>
+              <a:t>‹nr.›</a:t>
             </a:fld>
             <a:endParaRPr lang="en-US"/>
           </a:p>
@@ -1581,7 +1589,7 @@
           <a:p>
             <a:fld id="{C764DE79-268F-4C1A-8933-263129D2AF90}" type="datetimeFigureOut">
               <a:rPr lang="en-US" smtClean="0"/>
-              <a:t>3/10/2025</a:t>
+              <a:t>3/11/2025</a:t>
             </a:fld>
             <a:endParaRPr lang="en-US"/>
           </a:p>
@@ -1623,7 +1631,7 @@
           <a:p>
             <a:fld id="{48F63A3B-78C7-47BE-AE5E-E10140E04643}" type="slidenum">
               <a:rPr lang="en-US" smtClean="0"/>
-              <a:t>‹#›</a:t>
+              <a:t>‹nr.›</a:t>
             </a:fld>
             <a:endParaRPr lang="en-US"/>
           </a:p>
@@ -1948,7 +1956,7 @@
           <a:p>
             <a:fld id="{C764DE79-268F-4C1A-8933-263129D2AF90}" type="datetimeFigureOut">
               <a:rPr lang="en-US" smtClean="0"/>
-              <a:t>3/10/2025</a:t>
+              <a:t>3/11/2025</a:t>
             </a:fld>
             <a:endParaRPr lang="en-US"/>
           </a:p>
@@ -1990,7 +1998,7 @@
           <a:p>
             <a:fld id="{48F63A3B-78C7-47BE-AE5E-E10140E04643}" type="slidenum">
               <a:rPr lang="en-US" smtClean="0"/>
-              <a:t>‹#›</a:t>
+              <a:t>‹nr.›</a:t>
             </a:fld>
             <a:endParaRPr lang="en-US"/>
           </a:p>
@@ -2066,7 +2074,7 @@
           <a:p>
             <a:fld id="{C764DE79-268F-4C1A-8933-263129D2AF90}" type="datetimeFigureOut">
               <a:rPr lang="en-US" smtClean="0"/>
-              <a:t>3/10/2025</a:t>
+              <a:t>3/11/2025</a:t>
             </a:fld>
             <a:endParaRPr lang="en-US"/>
           </a:p>
@@ -2108,7 +2116,7 @@
           <a:p>
             <a:fld id="{48F63A3B-78C7-47BE-AE5E-E10140E04643}" type="slidenum">
               <a:rPr lang="en-US" smtClean="0"/>
-              <a:t>‹#›</a:t>
+              <a:t>‹nr.›</a:t>
             </a:fld>
             <a:endParaRPr lang="en-US"/>
           </a:p>
@@ -2161,7 +2169,7 @@
           <a:p>
             <a:fld id="{C764DE79-268F-4C1A-8933-263129D2AF90}" type="datetimeFigureOut">
               <a:rPr lang="en-US" smtClean="0"/>
-              <a:t>3/10/2025</a:t>
+              <a:t>3/11/2025</a:t>
             </a:fld>
             <a:endParaRPr lang="en-US"/>
           </a:p>
@@ -2203,7 +2211,7 @@
           <a:p>
             <a:fld id="{48F63A3B-78C7-47BE-AE5E-E10140E04643}" type="slidenum">
               <a:rPr lang="en-US" smtClean="0"/>
-              <a:t>‹#›</a:t>
+              <a:t>‹nr.›</a:t>
             </a:fld>
             <a:endParaRPr lang="en-US"/>
           </a:p>
@@ -2438,7 +2446,7 @@
           <a:p>
             <a:fld id="{C764DE79-268F-4C1A-8933-263129D2AF90}" type="datetimeFigureOut">
               <a:rPr lang="en-US" smtClean="0"/>
-              <a:t>3/10/2025</a:t>
+              <a:t>3/11/2025</a:t>
             </a:fld>
             <a:endParaRPr lang="en-US"/>
           </a:p>
@@ -2480,7 +2488,7 @@
           <a:p>
             <a:fld id="{48F63A3B-78C7-47BE-AE5E-E10140E04643}" type="slidenum">
               <a:rPr lang="en-US" smtClean="0"/>
-              <a:t>‹#›</a:t>
+              <a:t>‹nr.›</a:t>
             </a:fld>
             <a:endParaRPr lang="en-US"/>
           </a:p>
@@ -2695,7 +2703,7 @@
           <a:p>
             <a:fld id="{C764DE79-268F-4C1A-8933-263129D2AF90}" type="datetimeFigureOut">
               <a:rPr lang="en-US" smtClean="0"/>
-              <a:t>3/10/2025</a:t>
+              <a:t>3/11/2025</a:t>
             </a:fld>
             <a:endParaRPr lang="en-US"/>
           </a:p>
@@ -2737,7 +2745,7 @@
           <a:p>
             <a:fld id="{48F63A3B-78C7-47BE-AE5E-E10140E04643}" type="slidenum">
               <a:rPr lang="en-US" smtClean="0"/>
-              <a:t>‹#›</a:t>
+              <a:t>‹nr.›</a:t>
             </a:fld>
             <a:endParaRPr lang="en-US"/>
           </a:p>
@@ -2908,7 +2916,7 @@
           <a:p>
             <a:fld id="{C764DE79-268F-4C1A-8933-263129D2AF90}" type="datetimeFigureOut">
               <a:rPr lang="en-US" smtClean="0"/>
-              <a:t>3/10/2025</a:t>
+              <a:t>3/11/2025</a:t>
             </a:fld>
             <a:endParaRPr lang="en-US"/>
           </a:p>
@@ -2986,7 +2994,7 @@
           <a:p>
             <a:fld id="{48F63A3B-78C7-47BE-AE5E-E10140E04643}" type="slidenum">
               <a:rPr lang="en-US" smtClean="0"/>
-              <a:t>‹#›</a:t>
+              <a:t>‹nr.›</a:t>
             </a:fld>
             <a:endParaRPr lang="en-US"/>
           </a:p>
@@ -3480,7 +3488,7 @@
         </p:blipFill>
         <p:spPr>
           <a:xfrm>
-            <a:off x="8705726" y="-542"/>
+            <a:off x="8705727" y="14339"/>
             <a:ext cx="4095874" cy="2250000"/>
           </a:xfrm>
           <a:prstGeom prst="rect">

</xml_diff>

<commit_message>
update het afiche met de comentaar die ik kreeg
</commit_message>
<xml_diff>
--- a/school/afiche.pptx
+++ b/school/afiche.pptx
@@ -115,8 +115,7 @@
 <file path=ppt/revisionInfo.xml><?xml version="1.0" encoding="utf-8"?>
 <p1510:revInfo xmlns:a="http://schemas.openxmlformats.org/drawingml/2006/main" xmlns:r="http://schemas.openxmlformats.org/officeDocument/2006/relationships" xmlns:p1510="http://schemas.microsoft.com/office/powerpoint/2015/10/main">
   <p1510:revLst>
-    <p1510:client id="{5D434D30-F688-4623-B10D-9AE1AB3633DC}" v="37" dt="2025-03-11T07:32:40.822"/>
-    <p1510:client id="{E35881AE-9567-4434-882A-640E432DFEFF}" v="96" dt="2025-03-10T17:58:00.873"/>
+    <p1510:client id="{5D434D30-F688-4623-B10D-9AE1AB3633DC}" v="60" dt="2025-03-13T18:10:41.384"/>
   </p1510:revLst>
 </p1510:revInfo>
 </file>
@@ -126,18 +125,18 @@
   <pc:docChgLst>
     <pc:chgData name="Debakker Stan" userId="dcaf6aa6-4ff3-4b00-8b67-253531728245" providerId="ADAL" clId="{5D434D30-F688-4623-B10D-9AE1AB3633DC}"/>
     <pc:docChg chg="undo custSel addSld modSld modMainMaster">
-      <pc:chgData name="Debakker Stan" userId="dcaf6aa6-4ff3-4b00-8b67-253531728245" providerId="ADAL" clId="{5D434D30-F688-4623-B10D-9AE1AB3633DC}" dt="2025-03-11T07:34:12.106" v="271" actId="478"/>
+      <pc:chgData name="Debakker Stan" userId="dcaf6aa6-4ff3-4b00-8b67-253531728245" providerId="ADAL" clId="{5D434D30-F688-4623-B10D-9AE1AB3633DC}" dt="2025-03-13T18:15:58.586" v="518" actId="20577"/>
       <pc:docMkLst>
         <pc:docMk/>
       </pc:docMkLst>
       <pc:sldChg chg="addSp delSp modSp new mod">
-        <pc:chgData name="Debakker Stan" userId="dcaf6aa6-4ff3-4b00-8b67-253531728245" providerId="ADAL" clId="{5D434D30-F688-4623-B10D-9AE1AB3633DC}" dt="2025-03-11T07:34:12.106" v="271" actId="478"/>
+        <pc:chgData name="Debakker Stan" userId="dcaf6aa6-4ff3-4b00-8b67-253531728245" providerId="ADAL" clId="{5D434D30-F688-4623-B10D-9AE1AB3633DC}" dt="2025-03-13T18:15:58.586" v="518" actId="20577"/>
         <pc:sldMkLst>
           <pc:docMk/>
           <pc:sldMk cId="428378912" sldId="256"/>
         </pc:sldMkLst>
         <pc:spChg chg="mod">
-          <ac:chgData name="Debakker Stan" userId="dcaf6aa6-4ff3-4b00-8b67-253531728245" providerId="ADAL" clId="{5D434D30-F688-4623-B10D-9AE1AB3633DC}" dt="2025-03-10T12:19:48.374" v="259" actId="1076"/>
+          <ac:chgData name="Debakker Stan" userId="dcaf6aa6-4ff3-4b00-8b67-253531728245" providerId="ADAL" clId="{5D434D30-F688-4623-B10D-9AE1AB3633DC}" dt="2025-03-13T18:14:47.976" v="514" actId="404"/>
           <ac:spMkLst>
             <pc:docMk/>
             <pc:sldMk cId="428378912" sldId="256"/>
@@ -145,71 +144,23 @@
           </ac:spMkLst>
         </pc:spChg>
         <pc:spChg chg="mod">
-          <ac:chgData name="Debakker Stan" userId="dcaf6aa6-4ff3-4b00-8b67-253531728245" providerId="ADAL" clId="{5D434D30-F688-4623-B10D-9AE1AB3633DC}" dt="2025-03-10T12:09:12.773" v="237" actId="1076"/>
+          <ac:chgData name="Debakker Stan" userId="dcaf6aa6-4ff3-4b00-8b67-253531728245" providerId="ADAL" clId="{5D434D30-F688-4623-B10D-9AE1AB3633DC}" dt="2025-03-13T18:15:58.586" v="518" actId="20577"/>
           <ac:spMkLst>
             <pc:docMk/>
             <pc:sldMk cId="428378912" sldId="256"/>
             <ac:spMk id="3" creationId="{428E0CFD-1F45-2EA2-0324-1D12560A0B9E}"/>
           </ac:spMkLst>
         </pc:spChg>
-        <pc:spChg chg="add del mod">
-          <ac:chgData name="Debakker Stan" userId="dcaf6aa6-4ff3-4b00-8b67-253531728245" providerId="ADAL" clId="{5D434D30-F688-4623-B10D-9AE1AB3633DC}" dt="2025-03-10T08:56:31.382" v="103" actId="478"/>
-          <ac:spMkLst>
-            <pc:docMk/>
-            <pc:sldMk cId="428378912" sldId="256"/>
-            <ac:spMk id="7" creationId="{9A906033-5C90-070B-90E2-6828ACEB54D3}"/>
-          </ac:spMkLst>
-        </pc:spChg>
-        <pc:spChg chg="add del mod">
-          <ac:chgData name="Debakker Stan" userId="dcaf6aa6-4ff3-4b00-8b67-253531728245" providerId="ADAL" clId="{5D434D30-F688-4623-B10D-9AE1AB3633DC}" dt="2025-03-10T11:53:55.303" v="185" actId="478"/>
-          <ac:spMkLst>
-            <pc:docMk/>
-            <pc:sldMk cId="428378912" sldId="256"/>
-            <ac:spMk id="11" creationId="{685AD8D1-1318-B56B-8E60-E8F5E2147F27}"/>
-          </ac:spMkLst>
-        </pc:spChg>
         <pc:graphicFrameChg chg="del mod">
-          <ac:chgData name="Debakker Stan" userId="dcaf6aa6-4ff3-4b00-8b67-253531728245" providerId="ADAL" clId="{5D434D30-F688-4623-B10D-9AE1AB3633DC}" dt="2025-03-10T11:40:30.100" v="151" actId="478"/>
+          <ac:chgData name="Debakker Stan" userId="dcaf6aa6-4ff3-4b00-8b67-253531728245" providerId="ADAL" clId="{5D434D30-F688-4623-B10D-9AE1AB3633DC}" dt="2025-03-13T18:10:52.420" v="432" actId="478"/>
           <ac:graphicFrameMkLst>
             <pc:docMk/>
             <pc:sldMk cId="428378912" sldId="256"/>
-            <ac:graphicFrameMk id="5" creationId="{E245EC5F-39A8-0BB9-1AAB-9412AB06AFCA}"/>
+            <ac:graphicFrameMk id="4" creationId="{0AC0BBCF-77FA-68F8-800C-1C968EFFBCFF}"/>
           </ac:graphicFrameMkLst>
         </pc:graphicFrameChg>
-        <pc:picChg chg="add del mod">
-          <ac:chgData name="Debakker Stan" userId="dcaf6aa6-4ff3-4b00-8b67-253531728245" providerId="ADAL" clId="{5D434D30-F688-4623-B10D-9AE1AB3633DC}" dt="2025-03-10T11:41:04.205" v="157" actId="478"/>
-          <ac:picMkLst>
-            <pc:docMk/>
-            <pc:sldMk cId="428378912" sldId="256"/>
-            <ac:picMk id="4" creationId="{346F970F-7967-898E-5FB2-7A1EE8403452}"/>
-          </ac:picMkLst>
-        </pc:picChg>
-        <pc:picChg chg="add del mod">
-          <ac:chgData name="Debakker Stan" userId="dcaf6aa6-4ff3-4b00-8b67-253531728245" providerId="ADAL" clId="{5D434D30-F688-4623-B10D-9AE1AB3633DC}" dt="2025-03-11T07:34:12.106" v="271" actId="478"/>
-          <ac:picMkLst>
-            <pc:docMk/>
-            <pc:sldMk cId="428378912" sldId="256"/>
-            <ac:picMk id="5" creationId="{67544987-F41B-82DC-1679-6C0E2FE1878B}"/>
-          </ac:picMkLst>
-        </pc:picChg>
-        <pc:picChg chg="add del mod">
-          <ac:chgData name="Debakker Stan" userId="dcaf6aa6-4ff3-4b00-8b67-253531728245" providerId="ADAL" clId="{5D434D30-F688-4623-B10D-9AE1AB3633DC}" dt="2025-03-10T11:50:30.332" v="161" actId="478"/>
-          <ac:picMkLst>
-            <pc:docMk/>
-            <pc:sldMk cId="428378912" sldId="256"/>
-            <ac:picMk id="6" creationId="{D3FEB3F1-85F8-AA83-2BB4-4BB0182F706B}"/>
-          </ac:picMkLst>
-        </pc:picChg>
-        <pc:picChg chg="add del mod ord">
-          <ac:chgData name="Debakker Stan" userId="dcaf6aa6-4ff3-4b00-8b67-253531728245" providerId="ADAL" clId="{5D434D30-F688-4623-B10D-9AE1AB3633DC}" dt="2025-03-10T08:43:24.709" v="92" actId="478"/>
-          <ac:picMkLst>
-            <pc:docMk/>
-            <pc:sldMk cId="428378912" sldId="256"/>
-            <ac:picMk id="8" creationId="{5CF9DBF4-7D69-2927-550E-0530C71F3C73}"/>
-          </ac:picMkLst>
-        </pc:picChg>
         <pc:picChg chg="add mod">
-          <ac:chgData name="Debakker Stan" userId="dcaf6aa6-4ff3-4b00-8b67-253531728245" providerId="ADAL" clId="{5D434D30-F688-4623-B10D-9AE1AB3633DC}" dt="2025-03-11T07:33:06.826" v="270" actId="1076"/>
+          <ac:chgData name="Debakker Stan" userId="dcaf6aa6-4ff3-4b00-8b67-253531728245" providerId="ADAL" clId="{5D434D30-F688-4623-B10D-9AE1AB3633DC}" dt="2025-03-13T17:56:02.699" v="338" actId="1076"/>
           <ac:picMkLst>
             <pc:docMk/>
             <pc:sldMk cId="428378912" sldId="256"/>
@@ -222,30 +173,6 @@
             <pc:docMk/>
             <pc:sldMk cId="428378912" sldId="256"/>
             <ac:picMk id="9" creationId="{904C2A26-561A-97AD-7F4D-D6A65F47890B}"/>
-          </ac:picMkLst>
-        </pc:picChg>
-        <pc:picChg chg="add del mod ord">
-          <ac:chgData name="Debakker Stan" userId="dcaf6aa6-4ff3-4b00-8b67-253531728245" providerId="ADAL" clId="{5D434D30-F688-4623-B10D-9AE1AB3633DC}" dt="2025-03-10T09:05:19.322" v="137" actId="478"/>
-          <ac:picMkLst>
-            <pc:docMk/>
-            <pc:sldMk cId="428378912" sldId="256"/>
-            <ac:picMk id="10" creationId="{72983E33-8D90-2797-F022-85E096F10CF7}"/>
-          </ac:picMkLst>
-        </pc:picChg>
-        <pc:picChg chg="add del mod modCrop">
-          <ac:chgData name="Debakker Stan" userId="dcaf6aa6-4ff3-4b00-8b67-253531728245" providerId="ADAL" clId="{5D434D30-F688-4623-B10D-9AE1AB3633DC}" dt="2025-03-10T12:07:23.449" v="190" actId="478"/>
-          <ac:picMkLst>
-            <pc:docMk/>
-            <pc:sldMk cId="428378912" sldId="256"/>
-            <ac:picMk id="12" creationId="{0D3A54EF-BC8C-C48A-3315-42E1B3747713}"/>
-          </ac:picMkLst>
-        </pc:picChg>
-        <pc:picChg chg="add del mod ord">
-          <ac:chgData name="Debakker Stan" userId="dcaf6aa6-4ff3-4b00-8b67-253531728245" providerId="ADAL" clId="{5D434D30-F688-4623-B10D-9AE1AB3633DC}" dt="2025-03-10T09:06:45.219" v="144" actId="478"/>
-          <ac:picMkLst>
-            <pc:docMk/>
-            <pc:sldMk cId="428378912" sldId="256"/>
-            <ac:picMk id="12" creationId="{1DBAA1D5-95BB-892B-24F3-22321BA0664E}"/>
           </ac:picMkLst>
         </pc:picChg>
         <pc:picChg chg="add mod ord">
@@ -270,6 +197,14 @@
             <pc:docMk/>
             <pc:sldMk cId="428378912" sldId="256"/>
             <ac:picMk id="17" creationId="{97E0183B-8CC1-F6D8-C7D5-DCCD35E9387B}"/>
+          </ac:picMkLst>
+        </pc:picChg>
+        <pc:picChg chg="add mod">
+          <ac:chgData name="Debakker Stan" userId="dcaf6aa6-4ff3-4b00-8b67-253531728245" providerId="ADAL" clId="{5D434D30-F688-4623-B10D-9AE1AB3633DC}" dt="2025-03-13T18:02:04.564" v="360" actId="1076"/>
+          <ac:picMkLst>
+            <pc:docMk/>
+            <pc:sldMk cId="428378912" sldId="256"/>
+            <ac:picMk id="1026" creationId="{E9965549-7A55-A9B9-8696-BDFE17B17DE1}"/>
           </ac:picMkLst>
         </pc:picChg>
       </pc:sldChg>
@@ -382,46 +317,6 @@
             <ac:spMk id="3" creationId="{428E0CFD-1F45-2EA2-0324-1D12560A0B9E}"/>
           </ac:spMkLst>
         </pc:spChg>
-        <pc:spChg chg="add del mod">
-          <ac:chgData name="Debakker Stan" userId="dcaf6aa6-4ff3-4b00-8b67-253531728245" providerId="ADAL" clId="{E35881AE-9567-4434-882A-640E432DFEFF}" dt="2025-03-10T17:45:34.816" v="74" actId="478"/>
-          <ac:spMkLst>
-            <pc:docMk/>
-            <pc:sldMk cId="428378912" sldId="256"/>
-            <ac:spMk id="4" creationId="{D8452F82-2005-9333-C40B-0D759A8BC191}"/>
-          </ac:spMkLst>
-        </pc:spChg>
-        <pc:spChg chg="add del mod">
-          <ac:chgData name="Debakker Stan" userId="dcaf6aa6-4ff3-4b00-8b67-253531728245" providerId="ADAL" clId="{E35881AE-9567-4434-882A-640E432DFEFF}" dt="2025-03-10T17:49:32.629" v="78" actId="22"/>
-          <ac:spMkLst>
-            <pc:docMk/>
-            <pc:sldMk cId="428378912" sldId="256"/>
-            <ac:spMk id="5" creationId="{6A282048-3D26-C01E-6982-617140813E47}"/>
-          </ac:spMkLst>
-        </pc:spChg>
-        <pc:spChg chg="add del">
-          <ac:chgData name="Debakker Stan" userId="dcaf6aa6-4ff3-4b00-8b67-253531728245" providerId="ADAL" clId="{E35881AE-9567-4434-882A-640E432DFEFF}" dt="2025-03-10T17:49:44.021" v="80" actId="22"/>
-          <ac:spMkLst>
-            <pc:docMk/>
-            <pc:sldMk cId="428378912" sldId="256"/>
-            <ac:spMk id="7" creationId="{EF1925C0-D47A-B926-013A-E352E1556D8D}"/>
-          </ac:spMkLst>
-        </pc:spChg>
-        <pc:picChg chg="add mod">
-          <ac:chgData name="Debakker Stan" userId="dcaf6aa6-4ff3-4b00-8b67-253531728245" providerId="ADAL" clId="{E35881AE-9567-4434-882A-640E432DFEFF}" dt="2025-03-10T17:50:33.877" v="85" actId="931"/>
-          <ac:picMkLst>
-            <pc:docMk/>
-            <pc:sldMk cId="428378912" sldId="256"/>
-            <ac:picMk id="11" creationId="{97B0A4B2-784D-14AE-E65C-B816A5BE94B6}"/>
-          </ac:picMkLst>
-        </pc:picChg>
-        <pc:picChg chg="add del">
-          <ac:chgData name="Debakker Stan" userId="dcaf6aa6-4ff3-4b00-8b67-253531728245" providerId="ADAL" clId="{E35881AE-9567-4434-882A-640E432DFEFF}" dt="2025-03-10T17:58:00.873" v="95" actId="478"/>
-          <ac:picMkLst>
-            <pc:docMk/>
-            <pc:sldMk cId="428378912" sldId="256"/>
-            <ac:picMk id="13" creationId="{FD141F52-A80E-6787-DD73-C16CE64D9D16}"/>
-          </ac:picMkLst>
-        </pc:picChg>
         <pc:picChg chg="add del">
           <ac:chgData name="Debakker Stan" userId="dcaf6aa6-4ff3-4b00-8b67-253531728245" providerId="ADAL" clId="{E35881AE-9567-4434-882A-640E432DFEFF}" dt="2025-03-10T17:44:13.306" v="35" actId="478"/>
           <ac:picMkLst>
@@ -444,14 +339,6 @@
             <pc:docMk/>
             <pc:sldMk cId="428378912" sldId="256"/>
             <ac:picMk id="17" creationId="{97E0183B-8CC1-F6D8-C7D5-DCCD35E9387B}"/>
-          </ac:picMkLst>
-        </pc:picChg>
-        <pc:picChg chg="add del mod">
-          <ac:chgData name="Debakker Stan" userId="dcaf6aa6-4ff3-4b00-8b67-253531728245" providerId="ADAL" clId="{E35881AE-9567-4434-882A-640E432DFEFF}" dt="2025-03-10T17:52:19.230" v="93" actId="478"/>
-          <ac:picMkLst>
-            <pc:docMk/>
-            <pc:sldMk cId="428378912" sldId="256"/>
-            <ac:picMk id="1026" creationId="{4F530E9B-EE52-6520-6189-6E7A444E85AA}"/>
           </ac:picMkLst>
         </pc:picChg>
       </pc:sldChg>
@@ -591,7 +478,7 @@
           <a:p>
             <a:fld id="{C764DE79-268F-4C1A-8933-263129D2AF90}" type="datetimeFigureOut">
               <a:rPr lang="en-US" smtClean="0"/>
-              <a:t>3/11/2025</a:t>
+              <a:t>3/13/2025</a:t>
             </a:fld>
             <a:endParaRPr lang="en-US"/>
           </a:p>
@@ -761,7 +648,7 @@
           <a:p>
             <a:fld id="{C764DE79-268F-4C1A-8933-263129D2AF90}" type="datetimeFigureOut">
               <a:rPr lang="en-US" smtClean="0"/>
-              <a:t>3/11/2025</a:t>
+              <a:t>3/13/2025</a:t>
             </a:fld>
             <a:endParaRPr lang="en-US"/>
           </a:p>
@@ -941,7 +828,7 @@
           <a:p>
             <a:fld id="{C764DE79-268F-4C1A-8933-263129D2AF90}" type="datetimeFigureOut">
               <a:rPr lang="en-US" smtClean="0"/>
-              <a:t>3/11/2025</a:t>
+              <a:t>3/13/2025</a:t>
             </a:fld>
             <a:endParaRPr lang="en-US"/>
           </a:p>
@@ -1111,7 +998,7 @@
           <a:p>
             <a:fld id="{C764DE79-268F-4C1A-8933-263129D2AF90}" type="datetimeFigureOut">
               <a:rPr lang="en-US" smtClean="0"/>
-              <a:t>3/11/2025</a:t>
+              <a:t>3/13/2025</a:t>
             </a:fld>
             <a:endParaRPr lang="en-US"/>
           </a:p>
@@ -1357,7 +1244,7 @@
           <a:p>
             <a:fld id="{C764DE79-268F-4C1A-8933-263129D2AF90}" type="datetimeFigureOut">
               <a:rPr lang="en-US" smtClean="0"/>
-              <a:t>3/11/2025</a:t>
+              <a:t>3/13/2025</a:t>
             </a:fld>
             <a:endParaRPr lang="en-US"/>
           </a:p>
@@ -1589,7 +1476,7 @@
           <a:p>
             <a:fld id="{C764DE79-268F-4C1A-8933-263129D2AF90}" type="datetimeFigureOut">
               <a:rPr lang="en-US" smtClean="0"/>
-              <a:t>3/11/2025</a:t>
+              <a:t>3/13/2025</a:t>
             </a:fld>
             <a:endParaRPr lang="en-US"/>
           </a:p>
@@ -1956,7 +1843,7 @@
           <a:p>
             <a:fld id="{C764DE79-268F-4C1A-8933-263129D2AF90}" type="datetimeFigureOut">
               <a:rPr lang="en-US" smtClean="0"/>
-              <a:t>3/11/2025</a:t>
+              <a:t>3/13/2025</a:t>
             </a:fld>
             <a:endParaRPr lang="en-US"/>
           </a:p>
@@ -2074,7 +1961,7 @@
           <a:p>
             <a:fld id="{C764DE79-268F-4C1A-8933-263129D2AF90}" type="datetimeFigureOut">
               <a:rPr lang="en-US" smtClean="0"/>
-              <a:t>3/11/2025</a:t>
+              <a:t>3/13/2025</a:t>
             </a:fld>
             <a:endParaRPr lang="en-US"/>
           </a:p>
@@ -2169,7 +2056,7 @@
           <a:p>
             <a:fld id="{C764DE79-268F-4C1A-8933-263129D2AF90}" type="datetimeFigureOut">
               <a:rPr lang="en-US" smtClean="0"/>
-              <a:t>3/11/2025</a:t>
+              <a:t>3/13/2025</a:t>
             </a:fld>
             <a:endParaRPr lang="en-US"/>
           </a:p>
@@ -2446,7 +2333,7 @@
           <a:p>
             <a:fld id="{C764DE79-268F-4C1A-8933-263129D2AF90}" type="datetimeFigureOut">
               <a:rPr lang="en-US" smtClean="0"/>
-              <a:t>3/11/2025</a:t>
+              <a:t>3/13/2025</a:t>
             </a:fld>
             <a:endParaRPr lang="en-US"/>
           </a:p>
@@ -2703,7 +2590,7 @@
           <a:p>
             <a:fld id="{C764DE79-268F-4C1A-8933-263129D2AF90}" type="datetimeFigureOut">
               <a:rPr lang="en-US" smtClean="0"/>
-              <a:t>3/11/2025</a:t>
+              <a:t>3/13/2025</a:t>
             </a:fld>
             <a:endParaRPr lang="en-US"/>
           </a:p>
@@ -2916,7 +2803,7 @@
           <a:p>
             <a:fld id="{C764DE79-268F-4C1A-8933-263129D2AF90}" type="datetimeFigureOut">
               <a:rPr lang="en-US" smtClean="0"/>
-              <a:t>3/11/2025</a:t>
+              <a:t>3/13/2025</a:t>
             </a:fld>
             <a:endParaRPr lang="en-US"/>
           </a:p>
@@ -3409,13 +3296,17 @@
         </p:spPr>
         <p:txBody>
           <a:bodyPr>
-            <a:normAutofit/>
+            <a:noAutofit/>
           </a:bodyPr>
           <a:lstStyle/>
           <a:p>
             <a:r>
-              <a:rPr lang="nl-NL"/>
-              <a:t>Oude robot moderniseren</a:t>
+              <a:rPr lang="nl-NL" sz="6600" dirty="0">
+                <a:latin typeface="JetBrains Mono" panose="02000009000000000000" pitchFamily="49" charset="0"/>
+                <a:ea typeface="JetBrains Mono" panose="02000009000000000000" pitchFamily="49" charset="0"/>
+                <a:cs typeface="JetBrains Mono" panose="02000009000000000000" pitchFamily="49" charset="0"/>
+              </a:rPr>
+              <a:t>OUDE ROBOT MODERNIZEREN</a:t>
             </a:r>
           </a:p>
         </p:txBody>
@@ -3438,7 +3329,7 @@
         </p:nvSpPr>
         <p:spPr>
           <a:xfrm>
-            <a:off x="0" y="1694241"/>
+            <a:off x="0" y="18623222"/>
             <a:ext cx="12801600" cy="576000"/>
           </a:xfrm>
         </p:spPr>
@@ -3449,14 +3340,13 @@
           <a:lstStyle/>
           <a:p>
             <a:r>
-              <a:rPr lang="nl-NL"/>
-              <a:t>Stan Debakker – 6 </a:t>
-            </a:r>
-            <a:r>
-              <a:rPr lang="nl-NL" err="1"/>
-              <a:t>TWEa</a:t>
-            </a:r>
-            <a:endParaRPr lang="nl-NL"/>
+              <a:rPr lang="nl-NL" dirty="0">
+                <a:latin typeface="JetBrains Mono" panose="02000009000000000000" pitchFamily="49" charset="0"/>
+                <a:ea typeface="JetBrains Mono" panose="02000009000000000000" pitchFamily="49" charset="0"/>
+                <a:cs typeface="JetBrains Mono" panose="02000009000000000000" pitchFamily="49" charset="0"/>
+              </a:rPr>
+              <a:t>Stan Debakker – 6TWEA</a:t>
+            </a:r>
           </a:p>
         </p:txBody>
       </p:sp>
@@ -3488,7 +3378,7 @@
         </p:blipFill>
         <p:spPr>
           <a:xfrm>
-            <a:off x="8705727" y="14339"/>
+            <a:off x="-10" y="-6"/>
             <a:ext cx="4095874" cy="2250000"/>
           </a:xfrm>
           <a:prstGeom prst="rect">
@@ -3566,6 +3456,53 @@
           <a:prstGeom prst="rect">
             <a:avLst/>
           </a:prstGeom>
+        </p:spPr>
+      </p:pic>
+      <p:pic>
+        <p:nvPicPr>
+          <p:cNvPr id="1026" name="Picture 2" descr="PIC16F877A-E/P">
+            <a:extLst>
+              <a:ext uri="{FF2B5EF4-FFF2-40B4-BE49-F238E27FC236}">
+                <a16:creationId xmlns:a16="http://schemas.microsoft.com/office/drawing/2014/main" id="{E9965549-7A55-A9B9-8696-BDFE17B17DE1}"/>
+              </a:ext>
+            </a:extLst>
+          </p:cNvPr>
+          <p:cNvPicPr>
+            <a:picLocks noChangeAspect="1" noChangeArrowheads="1"/>
+          </p:cNvPicPr>
+          <p:nvPr/>
+        </p:nvPicPr>
+        <p:blipFill>
+          <a:blip r:embed="rId7">
+            <a:extLst>
+              <a:ext uri="{28A0092B-C50C-407E-A947-70E740481C1C}">
+                <a14:useLocalDpi xmlns:a14="http://schemas.microsoft.com/office/drawing/2010/main" val="0"/>
+              </a:ext>
+            </a:extLst>
+          </a:blip>
+          <a:srcRect/>
+          <a:stretch>
+            <a:fillRect/>
+          </a:stretch>
+        </p:blipFill>
+        <p:spPr bwMode="auto">
+          <a:xfrm rot="16200000">
+            <a:off x="-951036" y="4699065"/>
+            <a:ext cx="3445200" cy="1543128"/>
+          </a:xfrm>
+          <a:prstGeom prst="rect">
+            <a:avLst/>
+          </a:prstGeom>
+          <a:noFill/>
+          <a:extLst>
+            <a:ext uri="{909E8E84-426E-40DD-AFC4-6F175D3DCCD1}">
+              <a14:hiddenFill xmlns:a14="http://schemas.microsoft.com/office/drawing/2010/main">
+                <a:solidFill>
+                  <a:srgbClr val="FFFFFF"/>
+                </a:solidFill>
+              </a14:hiddenFill>
+            </a:ext>
+          </a:extLst>
         </p:spPr>
       </p:pic>
     </p:spTree>

</xml_diff>

<commit_message>
kleine update van lijnsensor schema
</commit_message>
<xml_diff>
--- a/school/afiche.pptx
+++ b/school/afiche.pptx
@@ -2,7 +2,7 @@
 <file path=ppt/presentation.xml><?xml version="1.0" encoding="utf-8"?>
 <p:presentation xmlns:a="http://schemas.openxmlformats.org/drawingml/2006/main" xmlns:r="http://schemas.openxmlformats.org/officeDocument/2006/relationships" xmlns:p="http://schemas.openxmlformats.org/presentationml/2006/main" saveSubsetFonts="1">
   <p:sldMasterIdLst>
-    <p:sldMasterId id="2147483674" r:id="rId1"/>
+    <p:sldMasterId id="2147483710" r:id="rId1"/>
   </p:sldMasterIdLst>
   <p:sldIdLst>
     <p:sldId id="256" r:id="rId2"/>
@@ -11,9 +11,9 @@
   <p:notesSz cx="6858000" cy="9144000"/>
   <p:defaultTextStyle>
     <a:defPPr>
-      <a:defRPr lang="en-US"/>
+      <a:defRPr lang="nl-NL"/>
     </a:defPPr>
-    <a:lvl1pPr marL="0" algn="l" defTabSz="457200" rtl="0" eaLnBrk="1" latinLnBrk="0" hangingPunct="1">
+    <a:lvl1pPr marL="0" algn="l" defTabSz="914400" rtl="0" eaLnBrk="1" latinLnBrk="0" hangingPunct="1">
       <a:defRPr sz="1800" kern="1200">
         <a:solidFill>
           <a:schemeClr val="tx1"/>
@@ -23,7 +23,7 @@
         <a:cs typeface="+mn-cs"/>
       </a:defRPr>
     </a:lvl1pPr>
-    <a:lvl2pPr marL="457200" algn="l" defTabSz="457200" rtl="0" eaLnBrk="1" latinLnBrk="0" hangingPunct="1">
+    <a:lvl2pPr marL="457200" algn="l" defTabSz="914400" rtl="0" eaLnBrk="1" latinLnBrk="0" hangingPunct="1">
       <a:defRPr sz="1800" kern="1200">
         <a:solidFill>
           <a:schemeClr val="tx1"/>
@@ -33,7 +33,7 @@
         <a:cs typeface="+mn-cs"/>
       </a:defRPr>
     </a:lvl2pPr>
-    <a:lvl3pPr marL="914400" algn="l" defTabSz="457200" rtl="0" eaLnBrk="1" latinLnBrk="0" hangingPunct="1">
+    <a:lvl3pPr marL="914400" algn="l" defTabSz="914400" rtl="0" eaLnBrk="1" latinLnBrk="0" hangingPunct="1">
       <a:defRPr sz="1800" kern="1200">
         <a:solidFill>
           <a:schemeClr val="tx1"/>
@@ -43,7 +43,7 @@
         <a:cs typeface="+mn-cs"/>
       </a:defRPr>
     </a:lvl3pPr>
-    <a:lvl4pPr marL="1371600" algn="l" defTabSz="457200" rtl="0" eaLnBrk="1" latinLnBrk="0" hangingPunct="1">
+    <a:lvl4pPr marL="1371600" algn="l" defTabSz="914400" rtl="0" eaLnBrk="1" latinLnBrk="0" hangingPunct="1">
       <a:defRPr sz="1800" kern="1200">
         <a:solidFill>
           <a:schemeClr val="tx1"/>
@@ -53,7 +53,7 @@
         <a:cs typeface="+mn-cs"/>
       </a:defRPr>
     </a:lvl4pPr>
-    <a:lvl5pPr marL="1828800" algn="l" defTabSz="457200" rtl="0" eaLnBrk="1" latinLnBrk="0" hangingPunct="1">
+    <a:lvl5pPr marL="1828800" algn="l" defTabSz="914400" rtl="0" eaLnBrk="1" latinLnBrk="0" hangingPunct="1">
       <a:defRPr sz="1800" kern="1200">
         <a:solidFill>
           <a:schemeClr val="tx1"/>
@@ -63,7 +63,7 @@
         <a:cs typeface="+mn-cs"/>
       </a:defRPr>
     </a:lvl5pPr>
-    <a:lvl6pPr marL="2286000" algn="l" defTabSz="457200" rtl="0" eaLnBrk="1" latinLnBrk="0" hangingPunct="1">
+    <a:lvl6pPr marL="2286000" algn="l" defTabSz="914400" rtl="0" eaLnBrk="1" latinLnBrk="0" hangingPunct="1">
       <a:defRPr sz="1800" kern="1200">
         <a:solidFill>
           <a:schemeClr val="tx1"/>
@@ -73,7 +73,7 @@
         <a:cs typeface="+mn-cs"/>
       </a:defRPr>
     </a:lvl6pPr>
-    <a:lvl7pPr marL="2743200" algn="l" defTabSz="457200" rtl="0" eaLnBrk="1" latinLnBrk="0" hangingPunct="1">
+    <a:lvl7pPr marL="2743200" algn="l" defTabSz="914400" rtl="0" eaLnBrk="1" latinLnBrk="0" hangingPunct="1">
       <a:defRPr sz="1800" kern="1200">
         <a:solidFill>
           <a:schemeClr val="tx1"/>
@@ -83,7 +83,7 @@
         <a:cs typeface="+mn-cs"/>
       </a:defRPr>
     </a:lvl7pPr>
-    <a:lvl8pPr marL="3200400" algn="l" defTabSz="457200" rtl="0" eaLnBrk="1" latinLnBrk="0" hangingPunct="1">
+    <a:lvl8pPr marL="3200400" algn="l" defTabSz="914400" rtl="0" eaLnBrk="1" latinLnBrk="0" hangingPunct="1">
       <a:defRPr sz="1800" kern="1200">
         <a:solidFill>
           <a:schemeClr val="tx1"/>
@@ -93,7 +93,7 @@
         <a:cs typeface="+mn-cs"/>
       </a:defRPr>
     </a:lvl8pPr>
-    <a:lvl9pPr marL="3657600" algn="l" defTabSz="457200" rtl="0" eaLnBrk="1" latinLnBrk="0" hangingPunct="1">
+    <a:lvl9pPr marL="3657600" algn="l" defTabSz="914400" rtl="0" eaLnBrk="1" latinLnBrk="0" hangingPunct="1">
       <a:defRPr sz="1800" kern="1200">
         <a:solidFill>
           <a:schemeClr val="tx1"/>
@@ -115,7 +115,7 @@
 <file path=ppt/revisionInfo.xml><?xml version="1.0" encoding="utf-8"?>
 <p1510:revInfo xmlns:a="http://schemas.openxmlformats.org/drawingml/2006/main" xmlns:r="http://schemas.openxmlformats.org/officeDocument/2006/relationships" xmlns:p1510="http://schemas.microsoft.com/office/powerpoint/2015/10/main">
   <p1510:revLst>
-    <p1510:client id="{5D434D30-F688-4623-B10D-9AE1AB3633DC}" v="60" dt="2025-03-13T18:10:41.384"/>
+    <p1510:client id="{5D434D30-F688-4623-B10D-9AE1AB3633DC}" v="70" dt="2025-03-13T18:37:45.652"/>
   </p1510:revLst>
 </p1510:revInfo>
 </file>
@@ -125,12 +125,12 @@
   <pc:docChgLst>
     <pc:chgData name="Debakker Stan" userId="dcaf6aa6-4ff3-4b00-8b67-253531728245" providerId="ADAL" clId="{5D434D30-F688-4623-B10D-9AE1AB3633DC}"/>
     <pc:docChg chg="undo custSel addSld modSld modMainMaster">
-      <pc:chgData name="Debakker Stan" userId="dcaf6aa6-4ff3-4b00-8b67-253531728245" providerId="ADAL" clId="{5D434D30-F688-4623-B10D-9AE1AB3633DC}" dt="2025-03-13T18:15:58.586" v="518" actId="20577"/>
+      <pc:chgData name="Debakker Stan" userId="dcaf6aa6-4ff3-4b00-8b67-253531728245" providerId="ADAL" clId="{5D434D30-F688-4623-B10D-9AE1AB3633DC}" dt="2025-03-13T19:22:11.408" v="530" actId="732"/>
       <pc:docMkLst>
         <pc:docMk/>
       </pc:docMkLst>
       <pc:sldChg chg="addSp delSp modSp new mod">
-        <pc:chgData name="Debakker Stan" userId="dcaf6aa6-4ff3-4b00-8b67-253531728245" providerId="ADAL" clId="{5D434D30-F688-4623-B10D-9AE1AB3633DC}" dt="2025-03-13T18:15:58.586" v="518" actId="20577"/>
+        <pc:chgData name="Debakker Stan" userId="dcaf6aa6-4ff3-4b00-8b67-253531728245" providerId="ADAL" clId="{5D434D30-F688-4623-B10D-9AE1AB3633DC}" dt="2025-03-13T19:22:11.408" v="530" actId="732"/>
         <pc:sldMkLst>
           <pc:docMk/>
           <pc:sldMk cId="428378912" sldId="256"/>
@@ -160,6 +160,14 @@
           </ac:graphicFrameMkLst>
         </pc:graphicFrameChg>
         <pc:picChg chg="add mod">
+          <ac:chgData name="Debakker Stan" userId="dcaf6aa6-4ff3-4b00-8b67-253531728245" providerId="ADAL" clId="{5D434D30-F688-4623-B10D-9AE1AB3633DC}" dt="2025-03-13T18:35:36.373" v="522" actId="167"/>
+          <ac:picMkLst>
+            <pc:docMk/>
+            <pc:sldMk cId="428378912" sldId="256"/>
+            <ac:picMk id="4" creationId="{BAA316B4-43B8-D8AB-4545-7580A9C2C4AF}"/>
+          </ac:picMkLst>
+        </pc:picChg>
+        <pc:picChg chg="add mod">
           <ac:chgData name="Debakker Stan" userId="dcaf6aa6-4ff3-4b00-8b67-253531728245" providerId="ADAL" clId="{5D434D30-F688-4623-B10D-9AE1AB3633DC}" dt="2025-03-13T17:56:02.699" v="338" actId="1076"/>
           <ac:picMkLst>
             <pc:docMk/>
@@ -167,8 +175,8 @@
             <ac:picMk id="8" creationId="{C8413D58-BBC2-7428-4F98-0ABF47340AE4}"/>
           </ac:picMkLst>
         </pc:picChg>
-        <pc:picChg chg="add mod ord">
-          <ac:chgData name="Debakker Stan" userId="dcaf6aa6-4ff3-4b00-8b67-253531728245" providerId="ADAL" clId="{5D434D30-F688-4623-B10D-9AE1AB3633DC}" dt="2025-03-10T12:19:28.173" v="256" actId="14100"/>
+        <pc:picChg chg="add mod ord modCrop">
+          <ac:chgData name="Debakker Stan" userId="dcaf6aa6-4ff3-4b00-8b67-253531728245" providerId="ADAL" clId="{5D434D30-F688-4623-B10D-9AE1AB3633DC}" dt="2025-03-13T19:22:11.408" v="530" actId="732"/>
           <ac:picMkLst>
             <pc:docMk/>
             <pc:sldMk cId="428378912" sldId="256"/>
@@ -200,7 +208,7 @@
           </ac:picMkLst>
         </pc:picChg>
         <pc:picChg chg="add mod">
-          <ac:chgData name="Debakker Stan" userId="dcaf6aa6-4ff3-4b00-8b67-253531728245" providerId="ADAL" clId="{5D434D30-F688-4623-B10D-9AE1AB3633DC}" dt="2025-03-13T18:02:04.564" v="360" actId="1076"/>
+          <ac:chgData name="Debakker Stan" userId="dcaf6aa6-4ff3-4b00-8b67-253531728245" providerId="ADAL" clId="{5D434D30-F688-4623-B10D-9AE1AB3633DC}" dt="2025-03-13T18:37:45.651" v="529" actId="1076"/>
           <ac:picMkLst>
             <pc:docMk/>
             <pc:sldMk cId="428378912" sldId="256"/>
@@ -366,7 +374,13 @@
       </p:grpSpPr>
       <p:sp>
         <p:nvSpPr>
-          <p:cNvPr id="2" name="Title 1"/>
+          <p:cNvPr id="2" name="Titel 1">
+            <a:extLst>
+              <a:ext uri="{FF2B5EF4-FFF2-40B4-BE49-F238E27FC236}">
+                <a16:creationId xmlns:a16="http://schemas.microsoft.com/office/drawing/2014/main" id="{472DCE85-FE1B-991B-A774-96CA0611BFA4}"/>
+              </a:ext>
+            </a:extLst>
+          </p:cNvPr>
           <p:cNvSpPr>
             <a:spLocks noGrp="1"/>
           </p:cNvSpPr>
@@ -376,15 +390,15 @@
         </p:nvSpPr>
         <p:spPr>
           <a:xfrm>
-            <a:off x="960120" y="3142097"/>
-            <a:ext cx="10881360" cy="6684175"/>
+            <a:off x="1600200" y="3142097"/>
+            <a:ext cx="9601200" cy="6684175"/>
           </a:xfrm>
         </p:spPr>
         <p:txBody>
           <a:bodyPr anchor="b"/>
           <a:lstStyle>
             <a:lvl1pPr algn="ctr">
-              <a:defRPr sz="8400"/>
+              <a:defRPr sz="6300"/>
             </a:lvl1pPr>
           </a:lstStyle>
           <a:p>
@@ -392,13 +406,18 @@
               <a:rPr lang="nl-NL"/>
               <a:t>Klik om stijl te bewerken</a:t>
             </a:r>
-            <a:endParaRPr lang="en-US"/>
-          </a:p>
-        </p:txBody>
-      </p:sp>
-      <p:sp>
-        <p:nvSpPr>
-          <p:cNvPr id="3" name="Subtitle 2"/>
+          </a:p>
+        </p:txBody>
+      </p:sp>
+      <p:sp>
+        <p:nvSpPr>
+          <p:cNvPr id="3" name="Ondertitel 2">
+            <a:extLst>
+              <a:ext uri="{FF2B5EF4-FFF2-40B4-BE49-F238E27FC236}">
+                <a16:creationId xmlns:a16="http://schemas.microsoft.com/office/drawing/2014/main" id="{18B56769-50E9-8AAC-C861-BC41AEB5111C}"/>
+              </a:ext>
+            </a:extLst>
+          </p:cNvPr>
           <p:cNvSpPr>
             <a:spLocks noGrp="1"/>
           </p:cNvSpPr>
@@ -417,39 +436,39 @@
           <a:lstStyle>
             <a:lvl1pPr marL="0" indent="0" algn="ctr">
               <a:buNone/>
-              <a:defRPr sz="3360"/>
+              <a:defRPr sz="2520"/>
             </a:lvl1pPr>
-            <a:lvl2pPr marL="640080" indent="0" algn="ctr">
-              <a:buNone/>
-              <a:defRPr sz="2800"/>
+            <a:lvl2pPr marL="480060" indent="0" algn="ctr">
+              <a:buNone/>
+              <a:defRPr sz="2100"/>
             </a:lvl2pPr>
-            <a:lvl3pPr marL="1280160" indent="0" algn="ctr">
-              <a:buNone/>
-              <a:defRPr sz="2520"/>
+            <a:lvl3pPr marL="960120" indent="0" algn="ctr">
+              <a:buNone/>
+              <a:defRPr sz="1890"/>
             </a:lvl3pPr>
-            <a:lvl4pPr marL="1920240" indent="0" algn="ctr">
-              <a:buNone/>
-              <a:defRPr sz="2240"/>
+            <a:lvl4pPr marL="1440180" indent="0" algn="ctr">
+              <a:buNone/>
+              <a:defRPr sz="1680"/>
             </a:lvl4pPr>
-            <a:lvl5pPr marL="2560320" indent="0" algn="ctr">
-              <a:buNone/>
-              <a:defRPr sz="2240"/>
+            <a:lvl5pPr marL="1920240" indent="0" algn="ctr">
+              <a:buNone/>
+              <a:defRPr sz="1680"/>
             </a:lvl5pPr>
-            <a:lvl6pPr marL="3200400" indent="0" algn="ctr">
-              <a:buNone/>
-              <a:defRPr sz="2240"/>
+            <a:lvl6pPr marL="2400300" indent="0" algn="ctr">
+              <a:buNone/>
+              <a:defRPr sz="1680"/>
             </a:lvl6pPr>
-            <a:lvl7pPr marL="3840480" indent="0" algn="ctr">
-              <a:buNone/>
-              <a:defRPr sz="2240"/>
+            <a:lvl7pPr marL="2880360" indent="0" algn="ctr">
+              <a:buNone/>
+              <a:defRPr sz="1680"/>
             </a:lvl7pPr>
-            <a:lvl8pPr marL="4480560" indent="0" algn="ctr">
-              <a:buNone/>
-              <a:defRPr sz="2240"/>
+            <a:lvl8pPr marL="3360420" indent="0" algn="ctr">
+              <a:buNone/>
+              <a:defRPr sz="1680"/>
             </a:lvl8pPr>
-            <a:lvl9pPr marL="5120640" indent="0" algn="ctr">
-              <a:buNone/>
-              <a:defRPr sz="2240"/>
+            <a:lvl9pPr marL="3840480" indent="0" algn="ctr">
+              <a:buNone/>
+              <a:defRPr sz="1680"/>
             </a:lvl9pPr>
           </a:lstStyle>
           <a:p>
@@ -457,13 +476,18 @@
               <a:rPr lang="nl-NL"/>
               <a:t>Klikken om de ondertitelstijl van het model te bewerken</a:t>
             </a:r>
-            <a:endParaRPr lang="en-US"/>
-          </a:p>
-        </p:txBody>
-      </p:sp>
-      <p:sp>
-        <p:nvSpPr>
-          <p:cNvPr id="4" name="Date Placeholder 3"/>
+          </a:p>
+        </p:txBody>
+      </p:sp>
+      <p:sp>
+        <p:nvSpPr>
+          <p:cNvPr id="4" name="Tijdelijke aanduiding voor datum 3">
+            <a:extLst>
+              <a:ext uri="{FF2B5EF4-FFF2-40B4-BE49-F238E27FC236}">
+                <a16:creationId xmlns:a16="http://schemas.microsoft.com/office/drawing/2014/main" id="{D3E158D7-A0AC-0F5B-FCC9-E28023ADEE15}"/>
+              </a:ext>
+            </a:extLst>
+          </p:cNvPr>
           <p:cNvSpPr>
             <a:spLocks noGrp="1"/>
           </p:cNvSpPr>
@@ -486,7 +510,13 @@
       </p:sp>
       <p:sp>
         <p:nvSpPr>
-          <p:cNvPr id="5" name="Footer Placeholder 4"/>
+          <p:cNvPr id="5" name="Tijdelijke aanduiding voor voettekst 4">
+            <a:extLst>
+              <a:ext uri="{FF2B5EF4-FFF2-40B4-BE49-F238E27FC236}">
+                <a16:creationId xmlns:a16="http://schemas.microsoft.com/office/drawing/2014/main" id="{74352A3F-D410-4637-3881-C1861B020AD1}"/>
+              </a:ext>
+            </a:extLst>
+          </p:cNvPr>
           <p:cNvSpPr>
             <a:spLocks noGrp="1"/>
           </p:cNvSpPr>
@@ -505,7 +535,13 @@
       </p:sp>
       <p:sp>
         <p:nvSpPr>
-          <p:cNvPr id="6" name="Slide Number Placeholder 5"/>
+          <p:cNvPr id="6" name="Tijdelijke aanduiding voor dianummer 5">
+            <a:extLst>
+              <a:ext uri="{FF2B5EF4-FFF2-40B4-BE49-F238E27FC236}">
+                <a16:creationId xmlns:a16="http://schemas.microsoft.com/office/drawing/2014/main" id="{A3DD10E4-B840-0979-2A61-42718183853C}"/>
+              </a:ext>
+            </a:extLst>
+          </p:cNvPr>
           <p:cNvSpPr>
             <a:spLocks noGrp="1"/>
           </p:cNvSpPr>
@@ -529,7 +565,7 @@
     </p:spTree>
     <p:extLst>
       <p:ext uri="{BB962C8B-B14F-4D97-AF65-F5344CB8AC3E}">
-        <p14:creationId xmlns:p14="http://schemas.microsoft.com/office/powerpoint/2010/main" val="2167476960"/>
+        <p14:creationId xmlns:p14="http://schemas.microsoft.com/office/powerpoint/2010/main" val="3064601635"/>
       </p:ext>
     </p:extLst>
   </p:cSld>
@@ -558,7 +594,13 @@
       </p:grpSpPr>
       <p:sp>
         <p:nvSpPr>
-          <p:cNvPr id="2" name="Title 1"/>
+          <p:cNvPr id="2" name="Titel 1">
+            <a:extLst>
+              <a:ext uri="{FF2B5EF4-FFF2-40B4-BE49-F238E27FC236}">
+                <a16:creationId xmlns:a16="http://schemas.microsoft.com/office/drawing/2014/main" id="{8D19F26E-67B9-B13B-6C05-0A69AAC6A8EB}"/>
+              </a:ext>
+            </a:extLst>
+          </p:cNvPr>
           <p:cNvSpPr>
             <a:spLocks noGrp="1"/>
           </p:cNvSpPr>
@@ -575,13 +617,18 @@
               <a:rPr lang="nl-NL"/>
               <a:t>Klik om stijl te bewerken</a:t>
             </a:r>
-            <a:endParaRPr lang="en-US"/>
-          </a:p>
-        </p:txBody>
-      </p:sp>
-      <p:sp>
-        <p:nvSpPr>
-          <p:cNvPr id="3" name="Vertical Text Placeholder 2"/>
+          </a:p>
+        </p:txBody>
+      </p:sp>
+      <p:sp>
+        <p:nvSpPr>
+          <p:cNvPr id="3" name="Tijdelijke aanduiding voor verticale tekst 2">
+            <a:extLst>
+              <a:ext uri="{FF2B5EF4-FFF2-40B4-BE49-F238E27FC236}">
+                <a16:creationId xmlns:a16="http://schemas.microsoft.com/office/drawing/2014/main" id="{CB446D7B-6536-73A7-D3F2-D66B8A1F353B}"/>
+              </a:ext>
+            </a:extLst>
+          </p:cNvPr>
           <p:cNvSpPr>
             <a:spLocks noGrp="1"/>
           </p:cNvSpPr>
@@ -627,13 +674,18 @@
               <a:rPr lang="nl-NL"/>
               <a:t>Vijfde niveau</a:t>
             </a:r>
-            <a:endParaRPr lang="en-US"/>
-          </a:p>
-        </p:txBody>
-      </p:sp>
-      <p:sp>
-        <p:nvSpPr>
-          <p:cNvPr id="4" name="Date Placeholder 3"/>
+          </a:p>
+        </p:txBody>
+      </p:sp>
+      <p:sp>
+        <p:nvSpPr>
+          <p:cNvPr id="4" name="Tijdelijke aanduiding voor datum 3">
+            <a:extLst>
+              <a:ext uri="{FF2B5EF4-FFF2-40B4-BE49-F238E27FC236}">
+                <a16:creationId xmlns:a16="http://schemas.microsoft.com/office/drawing/2014/main" id="{F672011E-0E8A-71C7-704B-BD45118708CF}"/>
+              </a:ext>
+            </a:extLst>
+          </p:cNvPr>
           <p:cNvSpPr>
             <a:spLocks noGrp="1"/>
           </p:cNvSpPr>
@@ -656,7 +708,13 @@
       </p:sp>
       <p:sp>
         <p:nvSpPr>
-          <p:cNvPr id="5" name="Footer Placeholder 4"/>
+          <p:cNvPr id="5" name="Tijdelijke aanduiding voor voettekst 4">
+            <a:extLst>
+              <a:ext uri="{FF2B5EF4-FFF2-40B4-BE49-F238E27FC236}">
+                <a16:creationId xmlns:a16="http://schemas.microsoft.com/office/drawing/2014/main" id="{51BCB8FE-3A31-7C89-D746-BBF3AD70EDEB}"/>
+              </a:ext>
+            </a:extLst>
+          </p:cNvPr>
           <p:cNvSpPr>
             <a:spLocks noGrp="1"/>
           </p:cNvSpPr>
@@ -675,7 +733,13 @@
       </p:sp>
       <p:sp>
         <p:nvSpPr>
-          <p:cNvPr id="6" name="Slide Number Placeholder 5"/>
+          <p:cNvPr id="6" name="Tijdelijke aanduiding voor dianummer 5">
+            <a:extLst>
+              <a:ext uri="{FF2B5EF4-FFF2-40B4-BE49-F238E27FC236}">
+                <a16:creationId xmlns:a16="http://schemas.microsoft.com/office/drawing/2014/main" id="{56F8CA44-9B2C-EF14-C302-69445BE926FB}"/>
+              </a:ext>
+            </a:extLst>
+          </p:cNvPr>
           <p:cNvSpPr>
             <a:spLocks noGrp="1"/>
           </p:cNvSpPr>
@@ -699,7 +763,7 @@
     </p:spTree>
     <p:extLst>
       <p:ext uri="{BB962C8B-B14F-4D97-AF65-F5344CB8AC3E}">
-        <p14:creationId xmlns:p14="http://schemas.microsoft.com/office/powerpoint/2010/main" val="1122865457"/>
+        <p14:creationId xmlns:p14="http://schemas.microsoft.com/office/powerpoint/2010/main" val="2291564316"/>
       </p:ext>
     </p:extLst>
   </p:cSld>
@@ -728,7 +792,13 @@
       </p:grpSpPr>
       <p:sp>
         <p:nvSpPr>
-          <p:cNvPr id="2" name="Vertical Title 1"/>
+          <p:cNvPr id="2" name="Verticale titel 1">
+            <a:extLst>
+              <a:ext uri="{FF2B5EF4-FFF2-40B4-BE49-F238E27FC236}">
+                <a16:creationId xmlns:a16="http://schemas.microsoft.com/office/drawing/2014/main" id="{A939192A-CBD3-603A-CF0F-5F3328274E65}"/>
+              </a:ext>
+            </a:extLst>
+          </p:cNvPr>
           <p:cNvSpPr>
             <a:spLocks noGrp="1"/>
           </p:cNvSpPr>
@@ -738,7 +808,7 @@
         </p:nvSpPr>
         <p:spPr>
           <a:xfrm>
-            <a:off x="9161146" y="1022181"/>
+            <a:off x="9161145" y="1022181"/>
             <a:ext cx="2760345" cy="16270456"/>
           </a:xfrm>
         </p:spPr>
@@ -750,13 +820,18 @@
               <a:rPr lang="nl-NL"/>
               <a:t>Klik om stijl te bewerken</a:t>
             </a:r>
-            <a:endParaRPr lang="en-US"/>
-          </a:p>
-        </p:txBody>
-      </p:sp>
-      <p:sp>
-        <p:nvSpPr>
-          <p:cNvPr id="3" name="Vertical Text Placeholder 2"/>
+          </a:p>
+        </p:txBody>
+      </p:sp>
+      <p:sp>
+        <p:nvSpPr>
+          <p:cNvPr id="3" name="Tijdelijke aanduiding voor verticale tekst 2">
+            <a:extLst>
+              <a:ext uri="{FF2B5EF4-FFF2-40B4-BE49-F238E27FC236}">
+                <a16:creationId xmlns:a16="http://schemas.microsoft.com/office/drawing/2014/main" id="{808ED822-DFCC-4568-8090-DB7B8A1E1ACE}"/>
+              </a:ext>
+            </a:extLst>
+          </p:cNvPr>
           <p:cNvSpPr>
             <a:spLocks noGrp="1"/>
           </p:cNvSpPr>
@@ -766,7 +841,7 @@
         </p:nvSpPr>
         <p:spPr>
           <a:xfrm>
-            <a:off x="880111" y="1022181"/>
+            <a:off x="880110" y="1022181"/>
             <a:ext cx="8121015" cy="16270456"/>
           </a:xfrm>
         </p:spPr>
@@ -807,13 +882,18 @@
               <a:rPr lang="nl-NL"/>
               <a:t>Vijfde niveau</a:t>
             </a:r>
-            <a:endParaRPr lang="en-US"/>
-          </a:p>
-        </p:txBody>
-      </p:sp>
-      <p:sp>
-        <p:nvSpPr>
-          <p:cNvPr id="4" name="Date Placeholder 3"/>
+          </a:p>
+        </p:txBody>
+      </p:sp>
+      <p:sp>
+        <p:nvSpPr>
+          <p:cNvPr id="4" name="Tijdelijke aanduiding voor datum 3">
+            <a:extLst>
+              <a:ext uri="{FF2B5EF4-FFF2-40B4-BE49-F238E27FC236}">
+                <a16:creationId xmlns:a16="http://schemas.microsoft.com/office/drawing/2014/main" id="{5D70FC95-5E12-F054-9495-A1570B6FC4A3}"/>
+              </a:ext>
+            </a:extLst>
+          </p:cNvPr>
           <p:cNvSpPr>
             <a:spLocks noGrp="1"/>
           </p:cNvSpPr>
@@ -836,7 +916,13 @@
       </p:sp>
       <p:sp>
         <p:nvSpPr>
-          <p:cNvPr id="5" name="Footer Placeholder 4"/>
+          <p:cNvPr id="5" name="Tijdelijke aanduiding voor voettekst 4">
+            <a:extLst>
+              <a:ext uri="{FF2B5EF4-FFF2-40B4-BE49-F238E27FC236}">
+                <a16:creationId xmlns:a16="http://schemas.microsoft.com/office/drawing/2014/main" id="{8BBBB5B1-6416-CBAD-08EC-8B30A0FCE5A4}"/>
+              </a:ext>
+            </a:extLst>
+          </p:cNvPr>
           <p:cNvSpPr>
             <a:spLocks noGrp="1"/>
           </p:cNvSpPr>
@@ -855,7 +941,13 @@
       </p:sp>
       <p:sp>
         <p:nvSpPr>
-          <p:cNvPr id="6" name="Slide Number Placeholder 5"/>
+          <p:cNvPr id="6" name="Tijdelijke aanduiding voor dianummer 5">
+            <a:extLst>
+              <a:ext uri="{FF2B5EF4-FFF2-40B4-BE49-F238E27FC236}">
+                <a16:creationId xmlns:a16="http://schemas.microsoft.com/office/drawing/2014/main" id="{DA51DF82-E4F2-0A1C-0960-9371663BD33C}"/>
+              </a:ext>
+            </a:extLst>
+          </p:cNvPr>
           <p:cNvSpPr>
             <a:spLocks noGrp="1"/>
           </p:cNvSpPr>
@@ -879,7 +971,7 @@
     </p:spTree>
     <p:extLst>
       <p:ext uri="{BB962C8B-B14F-4D97-AF65-F5344CB8AC3E}">
-        <p14:creationId xmlns:p14="http://schemas.microsoft.com/office/powerpoint/2010/main" val="2273069917"/>
+        <p14:creationId xmlns:p14="http://schemas.microsoft.com/office/powerpoint/2010/main" val="4272214100"/>
       </p:ext>
     </p:extLst>
   </p:cSld>
@@ -908,7 +1000,13 @@
       </p:grpSpPr>
       <p:sp>
         <p:nvSpPr>
-          <p:cNvPr id="2" name="Title 1"/>
+          <p:cNvPr id="2" name="Titel 1">
+            <a:extLst>
+              <a:ext uri="{FF2B5EF4-FFF2-40B4-BE49-F238E27FC236}">
+                <a16:creationId xmlns:a16="http://schemas.microsoft.com/office/drawing/2014/main" id="{3F89A86B-EC28-FCB2-B2ED-940AB213A5FE}"/>
+              </a:ext>
+            </a:extLst>
+          </p:cNvPr>
           <p:cNvSpPr>
             <a:spLocks noGrp="1"/>
           </p:cNvSpPr>
@@ -925,13 +1023,18 @@
               <a:rPr lang="nl-NL"/>
               <a:t>Klik om stijl te bewerken</a:t>
             </a:r>
-            <a:endParaRPr lang="en-US"/>
-          </a:p>
-        </p:txBody>
-      </p:sp>
-      <p:sp>
-        <p:nvSpPr>
-          <p:cNvPr id="3" name="Content Placeholder 2"/>
+          </a:p>
+        </p:txBody>
+      </p:sp>
+      <p:sp>
+        <p:nvSpPr>
+          <p:cNvPr id="3" name="Tijdelijke aanduiding voor inhoud 2">
+            <a:extLst>
+              <a:ext uri="{FF2B5EF4-FFF2-40B4-BE49-F238E27FC236}">
+                <a16:creationId xmlns:a16="http://schemas.microsoft.com/office/drawing/2014/main" id="{8CB61EC1-6AF4-7ACA-86C0-AA919204FCE9}"/>
+              </a:ext>
+            </a:extLst>
+          </p:cNvPr>
           <p:cNvSpPr>
             <a:spLocks noGrp="1"/>
           </p:cNvSpPr>
@@ -977,13 +1080,18 @@
               <a:rPr lang="nl-NL"/>
               <a:t>Vijfde niveau</a:t>
             </a:r>
-            <a:endParaRPr lang="en-US"/>
-          </a:p>
-        </p:txBody>
-      </p:sp>
-      <p:sp>
-        <p:nvSpPr>
-          <p:cNvPr id="4" name="Date Placeholder 3"/>
+          </a:p>
+        </p:txBody>
+      </p:sp>
+      <p:sp>
+        <p:nvSpPr>
+          <p:cNvPr id="4" name="Tijdelijke aanduiding voor datum 3">
+            <a:extLst>
+              <a:ext uri="{FF2B5EF4-FFF2-40B4-BE49-F238E27FC236}">
+                <a16:creationId xmlns:a16="http://schemas.microsoft.com/office/drawing/2014/main" id="{FE48D484-B3A3-D5B9-17E7-68B0D6B5CAE9}"/>
+              </a:ext>
+            </a:extLst>
+          </p:cNvPr>
           <p:cNvSpPr>
             <a:spLocks noGrp="1"/>
           </p:cNvSpPr>
@@ -1006,7 +1114,13 @@
       </p:sp>
       <p:sp>
         <p:nvSpPr>
-          <p:cNvPr id="5" name="Footer Placeholder 4"/>
+          <p:cNvPr id="5" name="Tijdelijke aanduiding voor voettekst 4">
+            <a:extLst>
+              <a:ext uri="{FF2B5EF4-FFF2-40B4-BE49-F238E27FC236}">
+                <a16:creationId xmlns:a16="http://schemas.microsoft.com/office/drawing/2014/main" id="{4E7A8BD1-48EC-8E3E-1241-013804B58550}"/>
+              </a:ext>
+            </a:extLst>
+          </p:cNvPr>
           <p:cNvSpPr>
             <a:spLocks noGrp="1"/>
           </p:cNvSpPr>
@@ -1025,7 +1139,13 @@
       </p:sp>
       <p:sp>
         <p:nvSpPr>
-          <p:cNvPr id="6" name="Slide Number Placeholder 5"/>
+          <p:cNvPr id="6" name="Tijdelijke aanduiding voor dianummer 5">
+            <a:extLst>
+              <a:ext uri="{FF2B5EF4-FFF2-40B4-BE49-F238E27FC236}">
+                <a16:creationId xmlns:a16="http://schemas.microsoft.com/office/drawing/2014/main" id="{A55B96F2-9E97-D2A0-62D7-C8630BE3B0B1}"/>
+              </a:ext>
+            </a:extLst>
+          </p:cNvPr>
           <p:cNvSpPr>
             <a:spLocks noGrp="1"/>
           </p:cNvSpPr>
@@ -1049,7 +1169,7 @@
     </p:spTree>
     <p:extLst>
       <p:ext uri="{BB962C8B-B14F-4D97-AF65-F5344CB8AC3E}">
-        <p14:creationId xmlns:p14="http://schemas.microsoft.com/office/powerpoint/2010/main" val="4015711229"/>
+        <p14:creationId xmlns:p14="http://schemas.microsoft.com/office/powerpoint/2010/main" val="2250598099"/>
       </p:ext>
     </p:extLst>
   </p:cSld>
@@ -1078,7 +1198,13 @@
       </p:grpSpPr>
       <p:sp>
         <p:nvSpPr>
-          <p:cNvPr id="2" name="Title 1"/>
+          <p:cNvPr id="2" name="Titel 1">
+            <a:extLst>
+              <a:ext uri="{FF2B5EF4-FFF2-40B4-BE49-F238E27FC236}">
+                <a16:creationId xmlns:a16="http://schemas.microsoft.com/office/drawing/2014/main" id="{F46A24C3-C490-7ADE-A726-E240EB59071E}"/>
+              </a:ext>
+            </a:extLst>
+          </p:cNvPr>
           <p:cNvSpPr>
             <a:spLocks noGrp="1"/>
           </p:cNvSpPr>
@@ -1088,7 +1214,7 @@
         </p:nvSpPr>
         <p:spPr>
           <a:xfrm>
-            <a:off x="873443" y="4786479"/>
+            <a:off x="873443" y="4786476"/>
             <a:ext cx="11041380" cy="7986343"/>
           </a:xfrm>
         </p:spPr>
@@ -1096,7 +1222,7 @@
           <a:bodyPr anchor="b"/>
           <a:lstStyle>
             <a:lvl1pPr>
-              <a:defRPr sz="8400"/>
+              <a:defRPr sz="6300"/>
             </a:lvl1pPr>
           </a:lstStyle>
           <a:p>
@@ -1104,13 +1230,18 @@
               <a:rPr lang="nl-NL"/>
               <a:t>Klik om stijl te bewerken</a:t>
             </a:r>
-            <a:endParaRPr lang="en-US"/>
-          </a:p>
-        </p:txBody>
-      </p:sp>
-      <p:sp>
-        <p:nvSpPr>
-          <p:cNvPr id="3" name="Text Placeholder 2"/>
+          </a:p>
+        </p:txBody>
+      </p:sp>
+      <p:sp>
+        <p:nvSpPr>
+          <p:cNvPr id="3" name="Tijdelijke aanduiding voor tekst 2">
+            <a:extLst>
+              <a:ext uri="{FF2B5EF4-FFF2-40B4-BE49-F238E27FC236}">
+                <a16:creationId xmlns:a16="http://schemas.microsoft.com/office/drawing/2014/main" id="{6F81968D-8B1E-D5CD-47FD-41088FC5FDCD}"/>
+              </a:ext>
+            </a:extLst>
+          </p:cNvPr>
           <p:cNvSpPr>
             <a:spLocks noGrp="1"/>
           </p:cNvSpPr>
@@ -1120,7 +1251,7 @@
         </p:nvSpPr>
         <p:spPr>
           <a:xfrm>
-            <a:off x="873443" y="12848376"/>
+            <a:off x="873443" y="12848373"/>
             <a:ext cx="11041380" cy="4199829"/>
           </a:xfrm>
         </p:spPr>
@@ -1129,7 +1260,7 @@
           <a:lstStyle>
             <a:lvl1pPr marL="0" indent="0">
               <a:buNone/>
-              <a:defRPr sz="3360">
+              <a:defRPr sz="2520">
                 <a:solidFill>
                   <a:schemeClr val="tx1">
                     <a:tint val="82000"/>
@@ -1137,9 +1268,9 @@
                 </a:solidFill>
               </a:defRPr>
             </a:lvl1pPr>
-            <a:lvl2pPr marL="640080" indent="0">
-              <a:buNone/>
-              <a:defRPr sz="2800">
+            <a:lvl2pPr marL="480060" indent="0">
+              <a:buNone/>
+              <a:defRPr sz="2100">
                 <a:solidFill>
                   <a:schemeClr val="tx1">
                     <a:tint val="82000"/>
@@ -1147,9 +1278,9 @@
                 </a:solidFill>
               </a:defRPr>
             </a:lvl2pPr>
-            <a:lvl3pPr marL="1280160" indent="0">
-              <a:buNone/>
-              <a:defRPr sz="2520">
+            <a:lvl3pPr marL="960120" indent="0">
+              <a:buNone/>
+              <a:defRPr sz="1890">
                 <a:solidFill>
                   <a:schemeClr val="tx1">
                     <a:tint val="82000"/>
@@ -1157,9 +1288,9 @@
                 </a:solidFill>
               </a:defRPr>
             </a:lvl3pPr>
-            <a:lvl4pPr marL="1920240" indent="0">
-              <a:buNone/>
-              <a:defRPr sz="2240">
+            <a:lvl4pPr marL="1440180" indent="0">
+              <a:buNone/>
+              <a:defRPr sz="1680">
                 <a:solidFill>
                   <a:schemeClr val="tx1">
                     <a:tint val="82000"/>
@@ -1167,9 +1298,9 @@
                 </a:solidFill>
               </a:defRPr>
             </a:lvl4pPr>
-            <a:lvl5pPr marL="2560320" indent="0">
-              <a:buNone/>
-              <a:defRPr sz="2240">
+            <a:lvl5pPr marL="1920240" indent="0">
+              <a:buNone/>
+              <a:defRPr sz="1680">
                 <a:solidFill>
                   <a:schemeClr val="tx1">
                     <a:tint val="82000"/>
@@ -1177,9 +1308,9 @@
                 </a:solidFill>
               </a:defRPr>
             </a:lvl5pPr>
-            <a:lvl6pPr marL="3200400" indent="0">
-              <a:buNone/>
-              <a:defRPr sz="2240">
+            <a:lvl6pPr marL="2400300" indent="0">
+              <a:buNone/>
+              <a:defRPr sz="1680">
                 <a:solidFill>
                   <a:schemeClr val="tx1">
                     <a:tint val="82000"/>
@@ -1187,9 +1318,9 @@
                 </a:solidFill>
               </a:defRPr>
             </a:lvl6pPr>
-            <a:lvl7pPr marL="3840480" indent="0">
-              <a:buNone/>
-              <a:defRPr sz="2240">
+            <a:lvl7pPr marL="2880360" indent="0">
+              <a:buNone/>
+              <a:defRPr sz="1680">
                 <a:solidFill>
                   <a:schemeClr val="tx1">
                     <a:tint val="82000"/>
@@ -1197,9 +1328,9 @@
                 </a:solidFill>
               </a:defRPr>
             </a:lvl7pPr>
-            <a:lvl8pPr marL="4480560" indent="0">
-              <a:buNone/>
-              <a:defRPr sz="2240">
+            <a:lvl8pPr marL="3360420" indent="0">
+              <a:buNone/>
+              <a:defRPr sz="1680">
                 <a:solidFill>
                   <a:schemeClr val="tx1">
                     <a:tint val="82000"/>
@@ -1207,9 +1338,9 @@
                 </a:solidFill>
               </a:defRPr>
             </a:lvl8pPr>
-            <a:lvl9pPr marL="5120640" indent="0">
-              <a:buNone/>
-              <a:defRPr sz="2240">
+            <a:lvl9pPr marL="3840480" indent="0">
+              <a:buNone/>
+              <a:defRPr sz="1680">
                 <a:solidFill>
                   <a:schemeClr val="tx1">
                     <a:tint val="82000"/>
@@ -1229,7 +1360,13 @@
       </p:sp>
       <p:sp>
         <p:nvSpPr>
-          <p:cNvPr id="4" name="Date Placeholder 3"/>
+          <p:cNvPr id="4" name="Tijdelijke aanduiding voor datum 3">
+            <a:extLst>
+              <a:ext uri="{FF2B5EF4-FFF2-40B4-BE49-F238E27FC236}">
+                <a16:creationId xmlns:a16="http://schemas.microsoft.com/office/drawing/2014/main" id="{88CEFD9F-B984-3A42-2BB0-0A11F31BD544}"/>
+              </a:ext>
+            </a:extLst>
+          </p:cNvPr>
           <p:cNvSpPr>
             <a:spLocks noGrp="1"/>
           </p:cNvSpPr>
@@ -1252,7 +1389,13 @@
       </p:sp>
       <p:sp>
         <p:nvSpPr>
-          <p:cNvPr id="5" name="Footer Placeholder 4"/>
+          <p:cNvPr id="5" name="Tijdelijke aanduiding voor voettekst 4">
+            <a:extLst>
+              <a:ext uri="{FF2B5EF4-FFF2-40B4-BE49-F238E27FC236}">
+                <a16:creationId xmlns:a16="http://schemas.microsoft.com/office/drawing/2014/main" id="{0DA63D98-7C86-333F-457B-84F996434185}"/>
+              </a:ext>
+            </a:extLst>
+          </p:cNvPr>
           <p:cNvSpPr>
             <a:spLocks noGrp="1"/>
           </p:cNvSpPr>
@@ -1271,7 +1414,13 @@
       </p:sp>
       <p:sp>
         <p:nvSpPr>
-          <p:cNvPr id="6" name="Slide Number Placeholder 5"/>
+          <p:cNvPr id="6" name="Tijdelijke aanduiding voor dianummer 5">
+            <a:extLst>
+              <a:ext uri="{FF2B5EF4-FFF2-40B4-BE49-F238E27FC236}">
+                <a16:creationId xmlns:a16="http://schemas.microsoft.com/office/drawing/2014/main" id="{96E99F3C-F42F-FAC3-7DAB-B2E334AC0761}"/>
+              </a:ext>
+            </a:extLst>
+          </p:cNvPr>
           <p:cNvSpPr>
             <a:spLocks noGrp="1"/>
           </p:cNvSpPr>
@@ -1295,7 +1444,7 @@
     </p:spTree>
     <p:extLst>
       <p:ext uri="{BB962C8B-B14F-4D97-AF65-F5344CB8AC3E}">
-        <p14:creationId xmlns:p14="http://schemas.microsoft.com/office/powerpoint/2010/main" val="3653507553"/>
+        <p14:creationId xmlns:p14="http://schemas.microsoft.com/office/powerpoint/2010/main" val="3075728130"/>
       </p:ext>
     </p:extLst>
   </p:cSld>
@@ -1324,7 +1473,13 @@
       </p:grpSpPr>
       <p:sp>
         <p:nvSpPr>
-          <p:cNvPr id="2" name="Title 1"/>
+          <p:cNvPr id="2" name="Titel 1">
+            <a:extLst>
+              <a:ext uri="{FF2B5EF4-FFF2-40B4-BE49-F238E27FC236}">
+                <a16:creationId xmlns:a16="http://schemas.microsoft.com/office/drawing/2014/main" id="{13075B96-5E21-C68D-3A3E-24F7A3956255}"/>
+              </a:ext>
+            </a:extLst>
+          </p:cNvPr>
           <p:cNvSpPr>
             <a:spLocks noGrp="1"/>
           </p:cNvSpPr>
@@ -1341,13 +1496,18 @@
               <a:rPr lang="nl-NL"/>
               <a:t>Klik om stijl te bewerken</a:t>
             </a:r>
-            <a:endParaRPr lang="en-US"/>
-          </a:p>
-        </p:txBody>
-      </p:sp>
-      <p:sp>
-        <p:nvSpPr>
-          <p:cNvPr id="3" name="Content Placeholder 2"/>
+          </a:p>
+        </p:txBody>
+      </p:sp>
+      <p:sp>
+        <p:nvSpPr>
+          <p:cNvPr id="3" name="Tijdelijke aanduiding voor inhoud 2">
+            <a:extLst>
+              <a:ext uri="{FF2B5EF4-FFF2-40B4-BE49-F238E27FC236}">
+                <a16:creationId xmlns:a16="http://schemas.microsoft.com/office/drawing/2014/main" id="{3AF42259-6C21-BF62-878A-3B8B98672CB7}"/>
+              </a:ext>
+            </a:extLst>
+          </p:cNvPr>
           <p:cNvSpPr>
             <a:spLocks noGrp="1"/>
           </p:cNvSpPr>
@@ -1398,13 +1558,18 @@
               <a:rPr lang="nl-NL"/>
               <a:t>Vijfde niveau</a:t>
             </a:r>
-            <a:endParaRPr lang="en-US"/>
-          </a:p>
-        </p:txBody>
-      </p:sp>
-      <p:sp>
-        <p:nvSpPr>
-          <p:cNvPr id="4" name="Content Placeholder 3"/>
+          </a:p>
+        </p:txBody>
+      </p:sp>
+      <p:sp>
+        <p:nvSpPr>
+          <p:cNvPr id="4" name="Tijdelijke aanduiding voor inhoud 3">
+            <a:extLst>
+              <a:ext uri="{FF2B5EF4-FFF2-40B4-BE49-F238E27FC236}">
+                <a16:creationId xmlns:a16="http://schemas.microsoft.com/office/drawing/2014/main" id="{BB7ED806-0C20-F01E-2D47-6C8AA041FD13}"/>
+              </a:ext>
+            </a:extLst>
+          </p:cNvPr>
           <p:cNvSpPr>
             <a:spLocks noGrp="1"/>
           </p:cNvSpPr>
@@ -1455,13 +1620,18 @@
               <a:rPr lang="nl-NL"/>
               <a:t>Vijfde niveau</a:t>
             </a:r>
-            <a:endParaRPr lang="en-US"/>
-          </a:p>
-        </p:txBody>
-      </p:sp>
-      <p:sp>
-        <p:nvSpPr>
-          <p:cNvPr id="5" name="Date Placeholder 4"/>
+          </a:p>
+        </p:txBody>
+      </p:sp>
+      <p:sp>
+        <p:nvSpPr>
+          <p:cNvPr id="5" name="Tijdelijke aanduiding voor datum 4">
+            <a:extLst>
+              <a:ext uri="{FF2B5EF4-FFF2-40B4-BE49-F238E27FC236}">
+                <a16:creationId xmlns:a16="http://schemas.microsoft.com/office/drawing/2014/main" id="{850C3C82-791F-A750-F2FE-BD18968E129D}"/>
+              </a:ext>
+            </a:extLst>
+          </p:cNvPr>
           <p:cNvSpPr>
             <a:spLocks noGrp="1"/>
           </p:cNvSpPr>
@@ -1484,7 +1654,13 @@
       </p:sp>
       <p:sp>
         <p:nvSpPr>
-          <p:cNvPr id="6" name="Footer Placeholder 5"/>
+          <p:cNvPr id="6" name="Tijdelijke aanduiding voor voettekst 5">
+            <a:extLst>
+              <a:ext uri="{FF2B5EF4-FFF2-40B4-BE49-F238E27FC236}">
+                <a16:creationId xmlns:a16="http://schemas.microsoft.com/office/drawing/2014/main" id="{2F12C9DF-317B-996B-836F-312B4A86C1EF}"/>
+              </a:ext>
+            </a:extLst>
+          </p:cNvPr>
           <p:cNvSpPr>
             <a:spLocks noGrp="1"/>
           </p:cNvSpPr>
@@ -1503,7 +1679,13 @@
       </p:sp>
       <p:sp>
         <p:nvSpPr>
-          <p:cNvPr id="7" name="Slide Number Placeholder 6"/>
+          <p:cNvPr id="7" name="Tijdelijke aanduiding voor dianummer 6">
+            <a:extLst>
+              <a:ext uri="{FF2B5EF4-FFF2-40B4-BE49-F238E27FC236}">
+                <a16:creationId xmlns:a16="http://schemas.microsoft.com/office/drawing/2014/main" id="{F8EE0B95-5279-E49E-380B-D8ACEF8770F3}"/>
+              </a:ext>
+            </a:extLst>
+          </p:cNvPr>
           <p:cNvSpPr>
             <a:spLocks noGrp="1"/>
           </p:cNvSpPr>
@@ -1527,7 +1709,7 @@
     </p:spTree>
     <p:extLst>
       <p:ext uri="{BB962C8B-B14F-4D97-AF65-F5344CB8AC3E}">
-        <p14:creationId xmlns:p14="http://schemas.microsoft.com/office/powerpoint/2010/main" val="160214893"/>
+        <p14:creationId xmlns:p14="http://schemas.microsoft.com/office/powerpoint/2010/main" val="828647217"/>
       </p:ext>
     </p:extLst>
   </p:cSld>
@@ -1556,7 +1738,13 @@
       </p:grpSpPr>
       <p:sp>
         <p:nvSpPr>
-          <p:cNvPr id="2" name="Title 1"/>
+          <p:cNvPr id="2" name="Titel 1">
+            <a:extLst>
+              <a:ext uri="{FF2B5EF4-FFF2-40B4-BE49-F238E27FC236}">
+                <a16:creationId xmlns:a16="http://schemas.microsoft.com/office/drawing/2014/main" id="{A98ECE88-C1F3-02CE-AA86-5887F66FAE0B}"/>
+              </a:ext>
+            </a:extLst>
+          </p:cNvPr>
           <p:cNvSpPr>
             <a:spLocks noGrp="1"/>
           </p:cNvSpPr>
@@ -1566,7 +1754,7 @@
         </p:nvSpPr>
         <p:spPr>
           <a:xfrm>
-            <a:off x="881777" y="1022185"/>
+            <a:off x="881777" y="1022182"/>
             <a:ext cx="11041380" cy="3710963"/>
           </a:xfrm>
         </p:spPr>
@@ -1578,13 +1766,18 @@
               <a:rPr lang="nl-NL"/>
               <a:t>Klik om stijl te bewerken</a:t>
             </a:r>
-            <a:endParaRPr lang="en-US"/>
-          </a:p>
-        </p:txBody>
-      </p:sp>
-      <p:sp>
-        <p:nvSpPr>
-          <p:cNvPr id="3" name="Text Placeholder 2"/>
+          </a:p>
+        </p:txBody>
+      </p:sp>
+      <p:sp>
+        <p:nvSpPr>
+          <p:cNvPr id="3" name="Tijdelijke aanduiding voor tekst 2">
+            <a:extLst>
+              <a:ext uri="{FF2B5EF4-FFF2-40B4-BE49-F238E27FC236}">
+                <a16:creationId xmlns:a16="http://schemas.microsoft.com/office/drawing/2014/main" id="{36F79891-2245-A402-2883-5B9D16B9BF43}"/>
+              </a:ext>
+            </a:extLst>
+          </p:cNvPr>
           <p:cNvSpPr>
             <a:spLocks noGrp="1"/>
           </p:cNvSpPr>
@@ -1594,7 +1787,7 @@
         </p:nvSpPr>
         <p:spPr>
           <a:xfrm>
-            <a:off x="881779" y="4706478"/>
+            <a:off x="881778" y="4706478"/>
             <a:ext cx="5415676" cy="2306572"/>
           </a:xfrm>
         </p:spPr>
@@ -1603,39 +1796,39 @@
           <a:lstStyle>
             <a:lvl1pPr marL="0" indent="0">
               <a:buNone/>
-              <a:defRPr sz="3360" b="1"/>
+              <a:defRPr sz="2520" b="1"/>
             </a:lvl1pPr>
-            <a:lvl2pPr marL="640080" indent="0">
-              <a:buNone/>
-              <a:defRPr sz="2800" b="1"/>
+            <a:lvl2pPr marL="480060" indent="0">
+              <a:buNone/>
+              <a:defRPr sz="2100" b="1"/>
             </a:lvl2pPr>
-            <a:lvl3pPr marL="1280160" indent="0">
-              <a:buNone/>
-              <a:defRPr sz="2520" b="1"/>
+            <a:lvl3pPr marL="960120" indent="0">
+              <a:buNone/>
+              <a:defRPr sz="1890" b="1"/>
             </a:lvl3pPr>
-            <a:lvl4pPr marL="1920240" indent="0">
-              <a:buNone/>
-              <a:defRPr sz="2240" b="1"/>
+            <a:lvl4pPr marL="1440180" indent="0">
+              <a:buNone/>
+              <a:defRPr sz="1680" b="1"/>
             </a:lvl4pPr>
-            <a:lvl5pPr marL="2560320" indent="0">
-              <a:buNone/>
-              <a:defRPr sz="2240" b="1"/>
+            <a:lvl5pPr marL="1920240" indent="0">
+              <a:buNone/>
+              <a:defRPr sz="1680" b="1"/>
             </a:lvl5pPr>
-            <a:lvl6pPr marL="3200400" indent="0">
-              <a:buNone/>
-              <a:defRPr sz="2240" b="1"/>
+            <a:lvl6pPr marL="2400300" indent="0">
+              <a:buNone/>
+              <a:defRPr sz="1680" b="1"/>
             </a:lvl6pPr>
-            <a:lvl7pPr marL="3840480" indent="0">
-              <a:buNone/>
-              <a:defRPr sz="2240" b="1"/>
+            <a:lvl7pPr marL="2880360" indent="0">
+              <a:buNone/>
+              <a:defRPr sz="1680" b="1"/>
             </a:lvl7pPr>
-            <a:lvl8pPr marL="4480560" indent="0">
-              <a:buNone/>
-              <a:defRPr sz="2240" b="1"/>
+            <a:lvl8pPr marL="3360420" indent="0">
+              <a:buNone/>
+              <a:defRPr sz="1680" b="1"/>
             </a:lvl8pPr>
-            <a:lvl9pPr marL="5120640" indent="0">
-              <a:buNone/>
-              <a:defRPr sz="2240" b="1"/>
+            <a:lvl9pPr marL="3840480" indent="0">
+              <a:buNone/>
+              <a:defRPr sz="1680" b="1"/>
             </a:lvl9pPr>
           </a:lstStyle>
           <a:p>
@@ -1649,7 +1842,13 @@
       </p:sp>
       <p:sp>
         <p:nvSpPr>
-          <p:cNvPr id="4" name="Content Placeholder 3"/>
+          <p:cNvPr id="4" name="Tijdelijke aanduiding voor inhoud 3">
+            <a:extLst>
+              <a:ext uri="{FF2B5EF4-FFF2-40B4-BE49-F238E27FC236}">
+                <a16:creationId xmlns:a16="http://schemas.microsoft.com/office/drawing/2014/main" id="{E4066A7A-044C-4120-38F6-AB358C823297}"/>
+              </a:ext>
+            </a:extLst>
+          </p:cNvPr>
           <p:cNvSpPr>
             <a:spLocks noGrp="1"/>
           </p:cNvSpPr>
@@ -1659,7 +1858,7 @@
         </p:nvSpPr>
         <p:spPr>
           <a:xfrm>
-            <a:off x="881779" y="7013050"/>
+            <a:off x="881778" y="7013050"/>
             <a:ext cx="5415676" cy="10315141"/>
           </a:xfrm>
         </p:spPr>
@@ -1700,13 +1899,18 @@
               <a:rPr lang="nl-NL"/>
               <a:t>Vijfde niveau</a:t>
             </a:r>
-            <a:endParaRPr lang="en-US"/>
-          </a:p>
-        </p:txBody>
-      </p:sp>
-      <p:sp>
-        <p:nvSpPr>
-          <p:cNvPr id="5" name="Text Placeholder 4"/>
+          </a:p>
+        </p:txBody>
+      </p:sp>
+      <p:sp>
+        <p:nvSpPr>
+          <p:cNvPr id="5" name="Tijdelijke aanduiding voor tekst 4">
+            <a:extLst>
+              <a:ext uri="{FF2B5EF4-FFF2-40B4-BE49-F238E27FC236}">
+                <a16:creationId xmlns:a16="http://schemas.microsoft.com/office/drawing/2014/main" id="{C2B1C5DF-B088-4778-2EC8-8A493A9A925C}"/>
+              </a:ext>
+            </a:extLst>
+          </p:cNvPr>
           <p:cNvSpPr>
             <a:spLocks noGrp="1"/>
           </p:cNvSpPr>
@@ -1716,7 +1920,7 @@
         </p:nvSpPr>
         <p:spPr>
           <a:xfrm>
-            <a:off x="6480811" y="4706478"/>
+            <a:off x="6480810" y="4706478"/>
             <a:ext cx="5442347" cy="2306572"/>
           </a:xfrm>
         </p:spPr>
@@ -1725,39 +1929,39 @@
           <a:lstStyle>
             <a:lvl1pPr marL="0" indent="0">
               <a:buNone/>
-              <a:defRPr sz="3360" b="1"/>
+              <a:defRPr sz="2520" b="1"/>
             </a:lvl1pPr>
-            <a:lvl2pPr marL="640080" indent="0">
-              <a:buNone/>
-              <a:defRPr sz="2800" b="1"/>
+            <a:lvl2pPr marL="480060" indent="0">
+              <a:buNone/>
+              <a:defRPr sz="2100" b="1"/>
             </a:lvl2pPr>
-            <a:lvl3pPr marL="1280160" indent="0">
-              <a:buNone/>
-              <a:defRPr sz="2520" b="1"/>
+            <a:lvl3pPr marL="960120" indent="0">
+              <a:buNone/>
+              <a:defRPr sz="1890" b="1"/>
             </a:lvl3pPr>
-            <a:lvl4pPr marL="1920240" indent="0">
-              <a:buNone/>
-              <a:defRPr sz="2240" b="1"/>
+            <a:lvl4pPr marL="1440180" indent="0">
+              <a:buNone/>
+              <a:defRPr sz="1680" b="1"/>
             </a:lvl4pPr>
-            <a:lvl5pPr marL="2560320" indent="0">
-              <a:buNone/>
-              <a:defRPr sz="2240" b="1"/>
+            <a:lvl5pPr marL="1920240" indent="0">
+              <a:buNone/>
+              <a:defRPr sz="1680" b="1"/>
             </a:lvl5pPr>
-            <a:lvl6pPr marL="3200400" indent="0">
-              <a:buNone/>
-              <a:defRPr sz="2240" b="1"/>
+            <a:lvl6pPr marL="2400300" indent="0">
+              <a:buNone/>
+              <a:defRPr sz="1680" b="1"/>
             </a:lvl6pPr>
-            <a:lvl7pPr marL="3840480" indent="0">
-              <a:buNone/>
-              <a:defRPr sz="2240" b="1"/>
+            <a:lvl7pPr marL="2880360" indent="0">
+              <a:buNone/>
+              <a:defRPr sz="1680" b="1"/>
             </a:lvl7pPr>
-            <a:lvl8pPr marL="4480560" indent="0">
-              <a:buNone/>
-              <a:defRPr sz="2240" b="1"/>
+            <a:lvl8pPr marL="3360420" indent="0">
+              <a:buNone/>
+              <a:defRPr sz="1680" b="1"/>
             </a:lvl8pPr>
-            <a:lvl9pPr marL="5120640" indent="0">
-              <a:buNone/>
-              <a:defRPr sz="2240" b="1"/>
+            <a:lvl9pPr marL="3840480" indent="0">
+              <a:buNone/>
+              <a:defRPr sz="1680" b="1"/>
             </a:lvl9pPr>
           </a:lstStyle>
           <a:p>
@@ -1771,7 +1975,13 @@
       </p:sp>
       <p:sp>
         <p:nvSpPr>
-          <p:cNvPr id="6" name="Content Placeholder 5"/>
+          <p:cNvPr id="6" name="Tijdelijke aanduiding voor inhoud 5">
+            <a:extLst>
+              <a:ext uri="{FF2B5EF4-FFF2-40B4-BE49-F238E27FC236}">
+                <a16:creationId xmlns:a16="http://schemas.microsoft.com/office/drawing/2014/main" id="{98BF58E7-E38A-6AF2-CA6F-8A9A125DC475}"/>
+              </a:ext>
+            </a:extLst>
+          </p:cNvPr>
           <p:cNvSpPr>
             <a:spLocks noGrp="1"/>
           </p:cNvSpPr>
@@ -1781,7 +1991,7 @@
         </p:nvSpPr>
         <p:spPr>
           <a:xfrm>
-            <a:off x="6480811" y="7013050"/>
+            <a:off x="6480810" y="7013050"/>
             <a:ext cx="5442347" cy="10315141"/>
           </a:xfrm>
         </p:spPr>
@@ -1822,13 +2032,18 @@
               <a:rPr lang="nl-NL"/>
               <a:t>Vijfde niveau</a:t>
             </a:r>
-            <a:endParaRPr lang="en-US"/>
-          </a:p>
-        </p:txBody>
-      </p:sp>
-      <p:sp>
-        <p:nvSpPr>
-          <p:cNvPr id="7" name="Date Placeholder 6"/>
+          </a:p>
+        </p:txBody>
+      </p:sp>
+      <p:sp>
+        <p:nvSpPr>
+          <p:cNvPr id="7" name="Tijdelijke aanduiding voor datum 6">
+            <a:extLst>
+              <a:ext uri="{FF2B5EF4-FFF2-40B4-BE49-F238E27FC236}">
+                <a16:creationId xmlns:a16="http://schemas.microsoft.com/office/drawing/2014/main" id="{0448FCC9-051A-66D1-8FE2-34D0963C98DB}"/>
+              </a:ext>
+            </a:extLst>
+          </p:cNvPr>
           <p:cNvSpPr>
             <a:spLocks noGrp="1"/>
           </p:cNvSpPr>
@@ -1851,7 +2066,13 @@
       </p:sp>
       <p:sp>
         <p:nvSpPr>
-          <p:cNvPr id="8" name="Footer Placeholder 7"/>
+          <p:cNvPr id="8" name="Tijdelijke aanduiding voor voettekst 7">
+            <a:extLst>
+              <a:ext uri="{FF2B5EF4-FFF2-40B4-BE49-F238E27FC236}">
+                <a16:creationId xmlns:a16="http://schemas.microsoft.com/office/drawing/2014/main" id="{D7053662-282B-2FDF-1C5B-5CCD4BE526F4}"/>
+              </a:ext>
+            </a:extLst>
+          </p:cNvPr>
           <p:cNvSpPr>
             <a:spLocks noGrp="1"/>
           </p:cNvSpPr>
@@ -1870,7 +2091,13 @@
       </p:sp>
       <p:sp>
         <p:nvSpPr>
-          <p:cNvPr id="9" name="Slide Number Placeholder 8"/>
+          <p:cNvPr id="9" name="Tijdelijke aanduiding voor dianummer 8">
+            <a:extLst>
+              <a:ext uri="{FF2B5EF4-FFF2-40B4-BE49-F238E27FC236}">
+                <a16:creationId xmlns:a16="http://schemas.microsoft.com/office/drawing/2014/main" id="{B31E9458-D3E0-2871-4D59-F7E72B1AF2B8}"/>
+              </a:ext>
+            </a:extLst>
+          </p:cNvPr>
           <p:cNvSpPr>
             <a:spLocks noGrp="1"/>
           </p:cNvSpPr>
@@ -1894,7 +2121,7 @@
     </p:spTree>
     <p:extLst>
       <p:ext uri="{BB962C8B-B14F-4D97-AF65-F5344CB8AC3E}">
-        <p14:creationId xmlns:p14="http://schemas.microsoft.com/office/powerpoint/2010/main" val="1251177191"/>
+        <p14:creationId xmlns:p14="http://schemas.microsoft.com/office/powerpoint/2010/main" val="247875980"/>
       </p:ext>
     </p:extLst>
   </p:cSld>
@@ -1923,7 +2150,13 @@
       </p:grpSpPr>
       <p:sp>
         <p:nvSpPr>
-          <p:cNvPr id="2" name="Title 1"/>
+          <p:cNvPr id="2" name="Titel 1">
+            <a:extLst>
+              <a:ext uri="{FF2B5EF4-FFF2-40B4-BE49-F238E27FC236}">
+                <a16:creationId xmlns:a16="http://schemas.microsoft.com/office/drawing/2014/main" id="{E9AB1AAC-BEA8-E0FF-8DD6-F4D8F99B81FD}"/>
+              </a:ext>
+            </a:extLst>
+          </p:cNvPr>
           <p:cNvSpPr>
             <a:spLocks noGrp="1"/>
           </p:cNvSpPr>
@@ -1940,13 +2173,18 @@
               <a:rPr lang="nl-NL"/>
               <a:t>Klik om stijl te bewerken</a:t>
             </a:r>
-            <a:endParaRPr lang="en-US"/>
-          </a:p>
-        </p:txBody>
-      </p:sp>
-      <p:sp>
-        <p:nvSpPr>
-          <p:cNvPr id="3" name="Date Placeholder 2"/>
+          </a:p>
+        </p:txBody>
+      </p:sp>
+      <p:sp>
+        <p:nvSpPr>
+          <p:cNvPr id="3" name="Tijdelijke aanduiding voor datum 2">
+            <a:extLst>
+              <a:ext uri="{FF2B5EF4-FFF2-40B4-BE49-F238E27FC236}">
+                <a16:creationId xmlns:a16="http://schemas.microsoft.com/office/drawing/2014/main" id="{D4FAED1A-0E4D-4277-2AE8-136FF36C1C31}"/>
+              </a:ext>
+            </a:extLst>
+          </p:cNvPr>
           <p:cNvSpPr>
             <a:spLocks noGrp="1"/>
           </p:cNvSpPr>
@@ -1969,7 +2207,13 @@
       </p:sp>
       <p:sp>
         <p:nvSpPr>
-          <p:cNvPr id="4" name="Footer Placeholder 3"/>
+          <p:cNvPr id="4" name="Tijdelijke aanduiding voor voettekst 3">
+            <a:extLst>
+              <a:ext uri="{FF2B5EF4-FFF2-40B4-BE49-F238E27FC236}">
+                <a16:creationId xmlns:a16="http://schemas.microsoft.com/office/drawing/2014/main" id="{98F015B7-D697-2C09-C521-87FD24ECEC3C}"/>
+              </a:ext>
+            </a:extLst>
+          </p:cNvPr>
           <p:cNvSpPr>
             <a:spLocks noGrp="1"/>
           </p:cNvSpPr>
@@ -1988,7 +2232,13 @@
       </p:sp>
       <p:sp>
         <p:nvSpPr>
-          <p:cNvPr id="5" name="Slide Number Placeholder 4"/>
+          <p:cNvPr id="5" name="Tijdelijke aanduiding voor dianummer 4">
+            <a:extLst>
+              <a:ext uri="{FF2B5EF4-FFF2-40B4-BE49-F238E27FC236}">
+                <a16:creationId xmlns:a16="http://schemas.microsoft.com/office/drawing/2014/main" id="{2F916412-35C1-7C50-C73B-F8ABE7359B28}"/>
+              </a:ext>
+            </a:extLst>
+          </p:cNvPr>
           <p:cNvSpPr>
             <a:spLocks noGrp="1"/>
           </p:cNvSpPr>
@@ -2012,7 +2262,7 @@
     </p:spTree>
     <p:extLst>
       <p:ext uri="{BB962C8B-B14F-4D97-AF65-F5344CB8AC3E}">
-        <p14:creationId xmlns:p14="http://schemas.microsoft.com/office/powerpoint/2010/main" val="155240114"/>
+        <p14:creationId xmlns:p14="http://schemas.microsoft.com/office/powerpoint/2010/main" val="2898540585"/>
       </p:ext>
     </p:extLst>
   </p:cSld>
@@ -2041,7 +2291,13 @@
       </p:grpSpPr>
       <p:sp>
         <p:nvSpPr>
-          <p:cNvPr id="2" name="Date Placeholder 1"/>
+          <p:cNvPr id="2" name="Tijdelijke aanduiding voor datum 1">
+            <a:extLst>
+              <a:ext uri="{FF2B5EF4-FFF2-40B4-BE49-F238E27FC236}">
+                <a16:creationId xmlns:a16="http://schemas.microsoft.com/office/drawing/2014/main" id="{375682BE-C23D-483E-E98E-A5743DEBB4BB}"/>
+              </a:ext>
+            </a:extLst>
+          </p:cNvPr>
           <p:cNvSpPr>
             <a:spLocks noGrp="1"/>
           </p:cNvSpPr>
@@ -2064,7 +2320,13 @@
       </p:sp>
       <p:sp>
         <p:nvSpPr>
-          <p:cNvPr id="3" name="Footer Placeholder 2"/>
+          <p:cNvPr id="3" name="Tijdelijke aanduiding voor voettekst 2">
+            <a:extLst>
+              <a:ext uri="{FF2B5EF4-FFF2-40B4-BE49-F238E27FC236}">
+                <a16:creationId xmlns:a16="http://schemas.microsoft.com/office/drawing/2014/main" id="{149AE9BD-913B-0D93-0D37-93653EA71585}"/>
+              </a:ext>
+            </a:extLst>
+          </p:cNvPr>
           <p:cNvSpPr>
             <a:spLocks noGrp="1"/>
           </p:cNvSpPr>
@@ -2083,7 +2345,13 @@
       </p:sp>
       <p:sp>
         <p:nvSpPr>
-          <p:cNvPr id="4" name="Slide Number Placeholder 3"/>
+          <p:cNvPr id="4" name="Tijdelijke aanduiding voor dianummer 3">
+            <a:extLst>
+              <a:ext uri="{FF2B5EF4-FFF2-40B4-BE49-F238E27FC236}">
+                <a16:creationId xmlns:a16="http://schemas.microsoft.com/office/drawing/2014/main" id="{7D647711-FA7F-7F1F-9866-FA8C5A67A713}"/>
+              </a:ext>
+            </a:extLst>
+          </p:cNvPr>
           <p:cNvSpPr>
             <a:spLocks noGrp="1"/>
           </p:cNvSpPr>
@@ -2107,7 +2375,7 @@
     </p:spTree>
     <p:extLst>
       <p:ext uri="{BB962C8B-B14F-4D97-AF65-F5344CB8AC3E}">
-        <p14:creationId xmlns:p14="http://schemas.microsoft.com/office/powerpoint/2010/main" val="287029217"/>
+        <p14:creationId xmlns:p14="http://schemas.microsoft.com/office/powerpoint/2010/main" val="1564801781"/>
       </p:ext>
     </p:extLst>
   </p:cSld>
@@ -2136,7 +2404,13 @@
       </p:grpSpPr>
       <p:sp>
         <p:nvSpPr>
-          <p:cNvPr id="2" name="Title 1"/>
+          <p:cNvPr id="2" name="Titel 1">
+            <a:extLst>
+              <a:ext uri="{FF2B5EF4-FFF2-40B4-BE49-F238E27FC236}">
+                <a16:creationId xmlns:a16="http://schemas.microsoft.com/office/drawing/2014/main" id="{DF9417E5-8D60-E7D9-9254-54C8F84CC406}"/>
+              </a:ext>
+            </a:extLst>
+          </p:cNvPr>
           <p:cNvSpPr>
             <a:spLocks noGrp="1"/>
           </p:cNvSpPr>
@@ -2154,7 +2428,7 @@
           <a:bodyPr anchor="b"/>
           <a:lstStyle>
             <a:lvl1pPr>
-              <a:defRPr sz="4480"/>
+              <a:defRPr sz="3360"/>
             </a:lvl1pPr>
           </a:lstStyle>
           <a:p>
@@ -2162,13 +2436,18 @@
               <a:rPr lang="nl-NL"/>
               <a:t>Klik om stijl te bewerken</a:t>
             </a:r>
-            <a:endParaRPr lang="en-US"/>
-          </a:p>
-        </p:txBody>
-      </p:sp>
-      <p:sp>
-        <p:nvSpPr>
-          <p:cNvPr id="3" name="Content Placeholder 2"/>
+          </a:p>
+        </p:txBody>
+      </p:sp>
+      <p:sp>
+        <p:nvSpPr>
+          <p:cNvPr id="3" name="Tijdelijke aanduiding voor inhoud 2">
+            <a:extLst>
+              <a:ext uri="{FF2B5EF4-FFF2-40B4-BE49-F238E27FC236}">
+                <a16:creationId xmlns:a16="http://schemas.microsoft.com/office/drawing/2014/main" id="{4A892FF8-45D1-B095-EE00-8538363B5071}"/>
+              </a:ext>
+            </a:extLst>
+          </p:cNvPr>
           <p:cNvSpPr>
             <a:spLocks noGrp="1"/>
           </p:cNvSpPr>
@@ -2178,7 +2457,7 @@
         </p:nvSpPr>
         <p:spPr>
           <a:xfrm>
-            <a:off x="5442347" y="2764337"/>
+            <a:off x="5442347" y="2764334"/>
             <a:ext cx="6480810" cy="13643894"/>
           </a:xfrm>
         </p:spPr>
@@ -2186,31 +2465,31 @@
           <a:bodyPr/>
           <a:lstStyle>
             <a:lvl1pPr>
-              <a:defRPr sz="4480"/>
+              <a:defRPr sz="3360"/>
             </a:lvl1pPr>
             <a:lvl2pPr>
-              <a:defRPr sz="3920"/>
+              <a:defRPr sz="2940"/>
             </a:lvl2pPr>
             <a:lvl3pPr>
-              <a:defRPr sz="3360"/>
+              <a:defRPr sz="2520"/>
             </a:lvl3pPr>
             <a:lvl4pPr>
-              <a:defRPr sz="2800"/>
+              <a:defRPr sz="2100"/>
             </a:lvl4pPr>
             <a:lvl5pPr>
-              <a:defRPr sz="2800"/>
+              <a:defRPr sz="2100"/>
             </a:lvl5pPr>
             <a:lvl6pPr>
-              <a:defRPr sz="2800"/>
+              <a:defRPr sz="2100"/>
             </a:lvl6pPr>
             <a:lvl7pPr>
-              <a:defRPr sz="2800"/>
+              <a:defRPr sz="2100"/>
             </a:lvl7pPr>
             <a:lvl8pPr>
-              <a:defRPr sz="2800"/>
+              <a:defRPr sz="2100"/>
             </a:lvl8pPr>
             <a:lvl9pPr>
-              <a:defRPr sz="2800"/>
+              <a:defRPr sz="2100"/>
             </a:lvl9pPr>
           </a:lstStyle>
           <a:p>
@@ -2247,13 +2526,18 @@
               <a:rPr lang="nl-NL"/>
               <a:t>Vijfde niveau</a:t>
             </a:r>
-            <a:endParaRPr lang="en-US"/>
-          </a:p>
-        </p:txBody>
-      </p:sp>
-      <p:sp>
-        <p:nvSpPr>
-          <p:cNvPr id="4" name="Text Placeholder 3"/>
+          </a:p>
+        </p:txBody>
+      </p:sp>
+      <p:sp>
+        <p:nvSpPr>
+          <p:cNvPr id="4" name="Tijdelijke aanduiding voor tekst 3">
+            <a:extLst>
+              <a:ext uri="{FF2B5EF4-FFF2-40B4-BE49-F238E27FC236}">
+                <a16:creationId xmlns:a16="http://schemas.microsoft.com/office/drawing/2014/main" id="{26C23380-5543-7118-5F3B-C8DB2938F600}"/>
+              </a:ext>
+            </a:extLst>
+          </p:cNvPr>
           <p:cNvSpPr>
             <a:spLocks noGrp="1"/>
           </p:cNvSpPr>
@@ -2272,39 +2556,39 @@
           <a:lstStyle>
             <a:lvl1pPr marL="0" indent="0">
               <a:buNone/>
-              <a:defRPr sz="2240"/>
+              <a:defRPr sz="1680"/>
             </a:lvl1pPr>
-            <a:lvl2pPr marL="640080" indent="0">
-              <a:buNone/>
-              <a:defRPr sz="1960"/>
+            <a:lvl2pPr marL="480060" indent="0">
+              <a:buNone/>
+              <a:defRPr sz="1470"/>
             </a:lvl2pPr>
-            <a:lvl3pPr marL="1280160" indent="0">
-              <a:buNone/>
-              <a:defRPr sz="1680"/>
+            <a:lvl3pPr marL="960120" indent="0">
+              <a:buNone/>
+              <a:defRPr sz="1260"/>
             </a:lvl3pPr>
-            <a:lvl4pPr marL="1920240" indent="0">
-              <a:buNone/>
-              <a:defRPr sz="1400"/>
+            <a:lvl4pPr marL="1440180" indent="0">
+              <a:buNone/>
+              <a:defRPr sz="1050"/>
             </a:lvl4pPr>
-            <a:lvl5pPr marL="2560320" indent="0">
-              <a:buNone/>
-              <a:defRPr sz="1400"/>
+            <a:lvl5pPr marL="1920240" indent="0">
+              <a:buNone/>
+              <a:defRPr sz="1050"/>
             </a:lvl5pPr>
-            <a:lvl6pPr marL="3200400" indent="0">
-              <a:buNone/>
-              <a:defRPr sz="1400"/>
+            <a:lvl6pPr marL="2400300" indent="0">
+              <a:buNone/>
+              <a:defRPr sz="1050"/>
             </a:lvl6pPr>
-            <a:lvl7pPr marL="3840480" indent="0">
-              <a:buNone/>
-              <a:defRPr sz="1400"/>
+            <a:lvl7pPr marL="2880360" indent="0">
+              <a:buNone/>
+              <a:defRPr sz="1050"/>
             </a:lvl7pPr>
-            <a:lvl8pPr marL="4480560" indent="0">
-              <a:buNone/>
-              <a:defRPr sz="1400"/>
+            <a:lvl8pPr marL="3360420" indent="0">
+              <a:buNone/>
+              <a:defRPr sz="1050"/>
             </a:lvl8pPr>
-            <a:lvl9pPr marL="5120640" indent="0">
-              <a:buNone/>
-              <a:defRPr sz="1400"/>
+            <a:lvl9pPr marL="3840480" indent="0">
+              <a:buNone/>
+              <a:defRPr sz="1050"/>
             </a:lvl9pPr>
           </a:lstStyle>
           <a:p>
@@ -2318,7 +2602,13 @@
       </p:sp>
       <p:sp>
         <p:nvSpPr>
-          <p:cNvPr id="5" name="Date Placeholder 4"/>
+          <p:cNvPr id="5" name="Tijdelijke aanduiding voor datum 4">
+            <a:extLst>
+              <a:ext uri="{FF2B5EF4-FFF2-40B4-BE49-F238E27FC236}">
+                <a16:creationId xmlns:a16="http://schemas.microsoft.com/office/drawing/2014/main" id="{BEA4D897-AD4C-E99D-4356-24341A80A49B}"/>
+              </a:ext>
+            </a:extLst>
+          </p:cNvPr>
           <p:cNvSpPr>
             <a:spLocks noGrp="1"/>
           </p:cNvSpPr>
@@ -2341,7 +2631,13 @@
       </p:sp>
       <p:sp>
         <p:nvSpPr>
-          <p:cNvPr id="6" name="Footer Placeholder 5"/>
+          <p:cNvPr id="6" name="Tijdelijke aanduiding voor voettekst 5">
+            <a:extLst>
+              <a:ext uri="{FF2B5EF4-FFF2-40B4-BE49-F238E27FC236}">
+                <a16:creationId xmlns:a16="http://schemas.microsoft.com/office/drawing/2014/main" id="{17AC5BC5-67BE-6878-9B42-25DB7D651174}"/>
+              </a:ext>
+            </a:extLst>
+          </p:cNvPr>
           <p:cNvSpPr>
             <a:spLocks noGrp="1"/>
           </p:cNvSpPr>
@@ -2360,7 +2656,13 @@
       </p:sp>
       <p:sp>
         <p:nvSpPr>
-          <p:cNvPr id="7" name="Slide Number Placeholder 6"/>
+          <p:cNvPr id="7" name="Tijdelijke aanduiding voor dianummer 6">
+            <a:extLst>
+              <a:ext uri="{FF2B5EF4-FFF2-40B4-BE49-F238E27FC236}">
+                <a16:creationId xmlns:a16="http://schemas.microsoft.com/office/drawing/2014/main" id="{B27FE8D9-8724-2745-69DE-5F9E6114A560}"/>
+              </a:ext>
+            </a:extLst>
+          </p:cNvPr>
           <p:cNvSpPr>
             <a:spLocks noGrp="1"/>
           </p:cNvSpPr>
@@ -2384,7 +2686,7 @@
     </p:spTree>
     <p:extLst>
       <p:ext uri="{BB962C8B-B14F-4D97-AF65-F5344CB8AC3E}">
-        <p14:creationId xmlns:p14="http://schemas.microsoft.com/office/powerpoint/2010/main" val="1702827798"/>
+        <p14:creationId xmlns:p14="http://schemas.microsoft.com/office/powerpoint/2010/main" val="3944782669"/>
       </p:ext>
     </p:extLst>
   </p:cSld>
@@ -2413,7 +2715,13 @@
       </p:grpSpPr>
       <p:sp>
         <p:nvSpPr>
-          <p:cNvPr id="2" name="Title 1"/>
+          <p:cNvPr id="2" name="Titel 1">
+            <a:extLst>
+              <a:ext uri="{FF2B5EF4-FFF2-40B4-BE49-F238E27FC236}">
+                <a16:creationId xmlns:a16="http://schemas.microsoft.com/office/drawing/2014/main" id="{CD17B407-760A-AA83-B91F-D3E33B361146}"/>
+              </a:ext>
+            </a:extLst>
+          </p:cNvPr>
           <p:cNvSpPr>
             <a:spLocks noGrp="1"/>
           </p:cNvSpPr>
@@ -2431,7 +2739,7 @@
           <a:bodyPr anchor="b"/>
           <a:lstStyle>
             <a:lvl1pPr>
-              <a:defRPr sz="4480"/>
+              <a:defRPr sz="3360"/>
             </a:lvl1pPr>
           </a:lstStyle>
           <a:p>
@@ -2439,15 +2747,20 @@
               <a:rPr lang="nl-NL"/>
               <a:t>Klik om stijl te bewerken</a:t>
             </a:r>
-            <a:endParaRPr lang="en-US"/>
-          </a:p>
-        </p:txBody>
-      </p:sp>
-      <p:sp>
-        <p:nvSpPr>
-          <p:cNvPr id="3" name="Picture Placeholder 2"/>
-          <p:cNvSpPr>
-            <a:spLocks noGrp="1" noChangeAspect="1"/>
+          </a:p>
+        </p:txBody>
+      </p:sp>
+      <p:sp>
+        <p:nvSpPr>
+          <p:cNvPr id="3" name="Tijdelijke aanduiding voor afbeelding 2">
+            <a:extLst>
+              <a:ext uri="{FF2B5EF4-FFF2-40B4-BE49-F238E27FC236}">
+                <a16:creationId xmlns:a16="http://schemas.microsoft.com/office/drawing/2014/main" id="{51F84E29-0B64-1EFA-4A21-C71683F9FC35}"/>
+              </a:ext>
+            </a:extLst>
+          </p:cNvPr>
+          <p:cNvSpPr>
+            <a:spLocks noGrp="1"/>
           </p:cNvSpPr>
           <p:nvPr>
             <p:ph type="pic" idx="1"/>
@@ -2455,62 +2768,64 @@
         </p:nvSpPr>
         <p:spPr>
           <a:xfrm>
-            <a:off x="5442347" y="2764337"/>
+            <a:off x="5442347" y="2764334"/>
             <a:ext cx="6480810" cy="13643894"/>
           </a:xfrm>
         </p:spPr>
         <p:txBody>
-          <a:bodyPr anchor="t"/>
+          <a:bodyPr/>
           <a:lstStyle>
             <a:lvl1pPr marL="0" indent="0">
               <a:buNone/>
-              <a:defRPr sz="4480"/>
+              <a:defRPr sz="3360"/>
             </a:lvl1pPr>
-            <a:lvl2pPr marL="640080" indent="0">
-              <a:buNone/>
-              <a:defRPr sz="3920"/>
+            <a:lvl2pPr marL="480060" indent="0">
+              <a:buNone/>
+              <a:defRPr sz="2940"/>
             </a:lvl2pPr>
-            <a:lvl3pPr marL="1280160" indent="0">
-              <a:buNone/>
-              <a:defRPr sz="3360"/>
+            <a:lvl3pPr marL="960120" indent="0">
+              <a:buNone/>
+              <a:defRPr sz="2520"/>
             </a:lvl3pPr>
-            <a:lvl4pPr marL="1920240" indent="0">
-              <a:buNone/>
-              <a:defRPr sz="2800"/>
+            <a:lvl4pPr marL="1440180" indent="0">
+              <a:buNone/>
+              <a:defRPr sz="2100"/>
             </a:lvl4pPr>
-            <a:lvl5pPr marL="2560320" indent="0">
-              <a:buNone/>
-              <a:defRPr sz="2800"/>
+            <a:lvl5pPr marL="1920240" indent="0">
+              <a:buNone/>
+              <a:defRPr sz="2100"/>
             </a:lvl5pPr>
-            <a:lvl6pPr marL="3200400" indent="0">
-              <a:buNone/>
-              <a:defRPr sz="2800"/>
+            <a:lvl6pPr marL="2400300" indent="0">
+              <a:buNone/>
+              <a:defRPr sz="2100"/>
             </a:lvl6pPr>
-            <a:lvl7pPr marL="3840480" indent="0">
-              <a:buNone/>
-              <a:defRPr sz="2800"/>
+            <a:lvl7pPr marL="2880360" indent="0">
+              <a:buNone/>
+              <a:defRPr sz="2100"/>
             </a:lvl7pPr>
-            <a:lvl8pPr marL="4480560" indent="0">
-              <a:buNone/>
-              <a:defRPr sz="2800"/>
+            <a:lvl8pPr marL="3360420" indent="0">
+              <a:buNone/>
+              <a:defRPr sz="2100"/>
             </a:lvl8pPr>
-            <a:lvl9pPr marL="5120640" indent="0">
-              <a:buNone/>
-              <a:defRPr sz="2800"/>
+            <a:lvl9pPr marL="3840480" indent="0">
+              <a:buNone/>
+              <a:defRPr sz="2100"/>
             </a:lvl9pPr>
           </a:lstStyle>
           <a:p>
-            <a:r>
-              <a:rPr lang="nl-NL"/>
-              <a:t>Klik op het pictogram als u een afbeelding wilt toevoegen</a:t>
-            </a:r>
-            <a:endParaRPr lang="en-US"/>
-          </a:p>
-        </p:txBody>
-      </p:sp>
-      <p:sp>
-        <p:nvSpPr>
-          <p:cNvPr id="4" name="Text Placeholder 3"/>
+            <a:endParaRPr lang="nl-NL"/>
+          </a:p>
+        </p:txBody>
+      </p:sp>
+      <p:sp>
+        <p:nvSpPr>
+          <p:cNvPr id="4" name="Tijdelijke aanduiding voor tekst 3">
+            <a:extLst>
+              <a:ext uri="{FF2B5EF4-FFF2-40B4-BE49-F238E27FC236}">
+                <a16:creationId xmlns:a16="http://schemas.microsoft.com/office/drawing/2014/main" id="{78139DEE-7BFE-4599-96C3-25D8857F2241}"/>
+              </a:ext>
+            </a:extLst>
+          </p:cNvPr>
           <p:cNvSpPr>
             <a:spLocks noGrp="1"/>
           </p:cNvSpPr>
@@ -2529,39 +2844,39 @@
           <a:lstStyle>
             <a:lvl1pPr marL="0" indent="0">
               <a:buNone/>
-              <a:defRPr sz="2240"/>
+              <a:defRPr sz="1680"/>
             </a:lvl1pPr>
-            <a:lvl2pPr marL="640080" indent="0">
-              <a:buNone/>
-              <a:defRPr sz="1960"/>
+            <a:lvl2pPr marL="480060" indent="0">
+              <a:buNone/>
+              <a:defRPr sz="1470"/>
             </a:lvl2pPr>
-            <a:lvl3pPr marL="1280160" indent="0">
-              <a:buNone/>
-              <a:defRPr sz="1680"/>
+            <a:lvl3pPr marL="960120" indent="0">
+              <a:buNone/>
+              <a:defRPr sz="1260"/>
             </a:lvl3pPr>
-            <a:lvl4pPr marL="1920240" indent="0">
-              <a:buNone/>
-              <a:defRPr sz="1400"/>
+            <a:lvl4pPr marL="1440180" indent="0">
+              <a:buNone/>
+              <a:defRPr sz="1050"/>
             </a:lvl4pPr>
-            <a:lvl5pPr marL="2560320" indent="0">
-              <a:buNone/>
-              <a:defRPr sz="1400"/>
+            <a:lvl5pPr marL="1920240" indent="0">
+              <a:buNone/>
+              <a:defRPr sz="1050"/>
             </a:lvl5pPr>
-            <a:lvl6pPr marL="3200400" indent="0">
-              <a:buNone/>
-              <a:defRPr sz="1400"/>
+            <a:lvl6pPr marL="2400300" indent="0">
+              <a:buNone/>
+              <a:defRPr sz="1050"/>
             </a:lvl6pPr>
-            <a:lvl7pPr marL="3840480" indent="0">
-              <a:buNone/>
-              <a:defRPr sz="1400"/>
+            <a:lvl7pPr marL="2880360" indent="0">
+              <a:buNone/>
+              <a:defRPr sz="1050"/>
             </a:lvl7pPr>
-            <a:lvl8pPr marL="4480560" indent="0">
-              <a:buNone/>
-              <a:defRPr sz="1400"/>
+            <a:lvl8pPr marL="3360420" indent="0">
+              <a:buNone/>
+              <a:defRPr sz="1050"/>
             </a:lvl8pPr>
-            <a:lvl9pPr marL="5120640" indent="0">
-              <a:buNone/>
-              <a:defRPr sz="1400"/>
+            <a:lvl9pPr marL="3840480" indent="0">
+              <a:buNone/>
+              <a:defRPr sz="1050"/>
             </a:lvl9pPr>
           </a:lstStyle>
           <a:p>
@@ -2575,7 +2890,13 @@
       </p:sp>
       <p:sp>
         <p:nvSpPr>
-          <p:cNvPr id="5" name="Date Placeholder 4"/>
+          <p:cNvPr id="5" name="Tijdelijke aanduiding voor datum 4">
+            <a:extLst>
+              <a:ext uri="{FF2B5EF4-FFF2-40B4-BE49-F238E27FC236}">
+                <a16:creationId xmlns:a16="http://schemas.microsoft.com/office/drawing/2014/main" id="{2CFFEA00-03BD-FC9C-AF72-7BEF1201A358}"/>
+              </a:ext>
+            </a:extLst>
+          </p:cNvPr>
           <p:cNvSpPr>
             <a:spLocks noGrp="1"/>
           </p:cNvSpPr>
@@ -2598,7 +2919,13 @@
       </p:sp>
       <p:sp>
         <p:nvSpPr>
-          <p:cNvPr id="6" name="Footer Placeholder 5"/>
+          <p:cNvPr id="6" name="Tijdelijke aanduiding voor voettekst 5">
+            <a:extLst>
+              <a:ext uri="{FF2B5EF4-FFF2-40B4-BE49-F238E27FC236}">
+                <a16:creationId xmlns:a16="http://schemas.microsoft.com/office/drawing/2014/main" id="{512F4A9C-13C8-7ADC-B667-2C2B86D9D16A}"/>
+              </a:ext>
+            </a:extLst>
+          </p:cNvPr>
           <p:cNvSpPr>
             <a:spLocks noGrp="1"/>
           </p:cNvSpPr>
@@ -2617,7 +2944,13 @@
       </p:sp>
       <p:sp>
         <p:nvSpPr>
-          <p:cNvPr id="7" name="Slide Number Placeholder 6"/>
+          <p:cNvPr id="7" name="Tijdelijke aanduiding voor dianummer 6">
+            <a:extLst>
+              <a:ext uri="{FF2B5EF4-FFF2-40B4-BE49-F238E27FC236}">
+                <a16:creationId xmlns:a16="http://schemas.microsoft.com/office/drawing/2014/main" id="{1A6E88C3-EB5B-57BB-572E-9F43544646BC}"/>
+              </a:ext>
+            </a:extLst>
+          </p:cNvPr>
           <p:cNvSpPr>
             <a:spLocks noGrp="1"/>
           </p:cNvSpPr>
@@ -2641,7 +2974,7 @@
     </p:spTree>
     <p:extLst>
       <p:ext uri="{BB962C8B-B14F-4D97-AF65-F5344CB8AC3E}">
-        <p14:creationId xmlns:p14="http://schemas.microsoft.com/office/powerpoint/2010/main" val="1525030729"/>
+        <p14:creationId xmlns:p14="http://schemas.microsoft.com/office/powerpoint/2010/main" val="945455288"/>
       </p:ext>
     </p:extLst>
   </p:cSld>
@@ -2675,7 +3008,13 @@
       </p:grpSpPr>
       <p:sp>
         <p:nvSpPr>
-          <p:cNvPr id="2" name="Title Placeholder 1"/>
+          <p:cNvPr id="2" name="Tijdelijke aanduiding voor titel 1">
+            <a:extLst>
+              <a:ext uri="{FF2B5EF4-FFF2-40B4-BE49-F238E27FC236}">
+                <a16:creationId xmlns:a16="http://schemas.microsoft.com/office/drawing/2014/main" id="{B8370986-9F25-AD0E-2543-0A22CDBE1930}"/>
+              </a:ext>
+            </a:extLst>
+          </p:cNvPr>
           <p:cNvSpPr>
             <a:spLocks noGrp="1"/>
           </p:cNvSpPr>
@@ -2685,7 +3024,7 @@
         </p:nvSpPr>
         <p:spPr>
           <a:xfrm>
-            <a:off x="880110" y="1022185"/>
+            <a:off x="880110" y="1022182"/>
             <a:ext cx="11041380" cy="3710963"/>
           </a:xfrm>
           <a:prstGeom prst="rect">
@@ -2702,13 +3041,18 @@
               <a:rPr lang="nl-NL"/>
               <a:t>Klik om stijl te bewerken</a:t>
             </a:r>
-            <a:endParaRPr lang="en-US"/>
-          </a:p>
-        </p:txBody>
-      </p:sp>
-      <p:sp>
-        <p:nvSpPr>
-          <p:cNvPr id="3" name="Text Placeholder 2"/>
+          </a:p>
+        </p:txBody>
+      </p:sp>
+      <p:sp>
+        <p:nvSpPr>
+          <p:cNvPr id="3" name="Tijdelijke aanduiding voor tekst 2">
+            <a:extLst>
+              <a:ext uri="{FF2B5EF4-FFF2-40B4-BE49-F238E27FC236}">
+                <a16:creationId xmlns:a16="http://schemas.microsoft.com/office/drawing/2014/main" id="{9AA55048-D259-9119-4AFD-433811A0AD5D}"/>
+              </a:ext>
+            </a:extLst>
+          </p:cNvPr>
           <p:cNvSpPr>
             <a:spLocks noGrp="1"/>
           </p:cNvSpPr>
@@ -2764,13 +3108,18 @@
               <a:rPr lang="nl-NL"/>
               <a:t>Vijfde niveau</a:t>
             </a:r>
-            <a:endParaRPr lang="en-US"/>
-          </a:p>
-        </p:txBody>
-      </p:sp>
-      <p:sp>
-        <p:nvSpPr>
-          <p:cNvPr id="4" name="Date Placeholder 3"/>
+          </a:p>
+        </p:txBody>
+      </p:sp>
+      <p:sp>
+        <p:nvSpPr>
+          <p:cNvPr id="4" name="Tijdelijke aanduiding voor datum 3">
+            <a:extLst>
+              <a:ext uri="{FF2B5EF4-FFF2-40B4-BE49-F238E27FC236}">
+                <a16:creationId xmlns:a16="http://schemas.microsoft.com/office/drawing/2014/main" id="{2362AD2E-3E75-17F3-2C50-2FF34C523595}"/>
+              </a:ext>
+            </a:extLst>
+          </p:cNvPr>
           <p:cNvSpPr>
             <a:spLocks noGrp="1"/>
           </p:cNvSpPr>
@@ -2780,7 +3129,7 @@
         </p:nvSpPr>
         <p:spPr>
           <a:xfrm>
-            <a:off x="880110" y="17794841"/>
+            <a:off x="880110" y="17794839"/>
             <a:ext cx="2880360" cy="1022181"/>
           </a:xfrm>
           <a:prstGeom prst="rect">
@@ -2791,7 +3140,7 @@
           <a:bodyPr vert="horz" lIns="91440" tIns="45720" rIns="91440" bIns="45720" rtlCol="0" anchor="ctr"/>
           <a:lstStyle>
             <a:lvl1pPr algn="l">
-              <a:defRPr sz="1680">
+              <a:defRPr sz="1260">
                 <a:solidFill>
                   <a:schemeClr val="tx1">
                     <a:tint val="82000"/>
@@ -2811,7 +3160,13 @@
       </p:sp>
       <p:sp>
         <p:nvSpPr>
-          <p:cNvPr id="5" name="Footer Placeholder 4"/>
+          <p:cNvPr id="5" name="Tijdelijke aanduiding voor voettekst 4">
+            <a:extLst>
+              <a:ext uri="{FF2B5EF4-FFF2-40B4-BE49-F238E27FC236}">
+                <a16:creationId xmlns:a16="http://schemas.microsoft.com/office/drawing/2014/main" id="{94B73197-61E4-1728-6EA7-8C8A9A2ECF23}"/>
+              </a:ext>
+            </a:extLst>
+          </p:cNvPr>
           <p:cNvSpPr>
             <a:spLocks noGrp="1"/>
           </p:cNvSpPr>
@@ -2821,7 +3176,7 @@
         </p:nvSpPr>
         <p:spPr>
           <a:xfrm>
-            <a:off x="4240530" y="17794841"/>
+            <a:off x="4240530" y="17794839"/>
             <a:ext cx="4320540" cy="1022181"/>
           </a:xfrm>
           <a:prstGeom prst="rect">
@@ -2832,7 +3187,7 @@
           <a:bodyPr vert="horz" lIns="91440" tIns="45720" rIns="91440" bIns="45720" rtlCol="0" anchor="ctr"/>
           <a:lstStyle>
             <a:lvl1pPr algn="ctr">
-              <a:defRPr sz="1680">
+              <a:defRPr sz="1260">
                 <a:solidFill>
                   <a:schemeClr val="tx1">
                     <a:tint val="82000"/>
@@ -2848,7 +3203,13 @@
       </p:sp>
       <p:sp>
         <p:nvSpPr>
-          <p:cNvPr id="6" name="Slide Number Placeholder 5"/>
+          <p:cNvPr id="6" name="Tijdelijke aanduiding voor dianummer 5">
+            <a:extLst>
+              <a:ext uri="{FF2B5EF4-FFF2-40B4-BE49-F238E27FC236}">
+                <a16:creationId xmlns:a16="http://schemas.microsoft.com/office/drawing/2014/main" id="{D24DAB0F-9C3E-1AB4-9003-D277A31DE6B3}"/>
+              </a:ext>
+            </a:extLst>
+          </p:cNvPr>
           <p:cNvSpPr>
             <a:spLocks noGrp="1"/>
           </p:cNvSpPr>
@@ -2858,7 +3219,7 @@
         </p:nvSpPr>
         <p:spPr>
           <a:xfrm>
-            <a:off x="9041130" y="17794841"/>
+            <a:off x="9041130" y="17794839"/>
             <a:ext cx="2880360" cy="1022181"/>
           </a:xfrm>
           <a:prstGeom prst="rect">
@@ -2869,7 +3230,7 @@
           <a:bodyPr vert="horz" lIns="91440" tIns="45720" rIns="91440" bIns="45720" rtlCol="0" anchor="ctr"/>
           <a:lstStyle>
             <a:lvl1pPr algn="r">
-              <a:defRPr sz="1680">
+              <a:defRPr sz="1260">
                 <a:solidFill>
                   <a:schemeClr val="tx1">
                     <a:tint val="82000"/>
@@ -2890,27 +3251,27 @@
     </p:spTree>
     <p:extLst>
       <p:ext uri="{BB962C8B-B14F-4D97-AF65-F5344CB8AC3E}">
-        <p14:creationId xmlns:p14="http://schemas.microsoft.com/office/powerpoint/2010/main" val="1376207536"/>
+        <p14:creationId xmlns:p14="http://schemas.microsoft.com/office/powerpoint/2010/main" val="1629584751"/>
       </p:ext>
     </p:extLst>
   </p:cSld>
   <p:clrMap bg1="lt1" tx1="dk1" bg2="lt2" tx2="dk2" accent1="accent1" accent2="accent2" accent3="accent3" accent4="accent4" accent5="accent5" accent6="accent6" hlink="hlink" folHlink="folHlink"/>
   <p:sldLayoutIdLst>
-    <p:sldLayoutId id="2147483675" r:id="rId1"/>
-    <p:sldLayoutId id="2147483676" r:id="rId2"/>
-    <p:sldLayoutId id="2147483677" r:id="rId3"/>
-    <p:sldLayoutId id="2147483678" r:id="rId4"/>
-    <p:sldLayoutId id="2147483679" r:id="rId5"/>
-    <p:sldLayoutId id="2147483680" r:id="rId6"/>
-    <p:sldLayoutId id="2147483681" r:id="rId7"/>
-    <p:sldLayoutId id="2147483682" r:id="rId8"/>
-    <p:sldLayoutId id="2147483683" r:id="rId9"/>
-    <p:sldLayoutId id="2147483684" r:id="rId10"/>
-    <p:sldLayoutId id="2147483685" r:id="rId11"/>
+    <p:sldLayoutId id="2147483711" r:id="rId1"/>
+    <p:sldLayoutId id="2147483712" r:id="rId2"/>
+    <p:sldLayoutId id="2147483713" r:id="rId3"/>
+    <p:sldLayoutId id="2147483714" r:id="rId4"/>
+    <p:sldLayoutId id="2147483715" r:id="rId5"/>
+    <p:sldLayoutId id="2147483716" r:id="rId6"/>
+    <p:sldLayoutId id="2147483717" r:id="rId7"/>
+    <p:sldLayoutId id="2147483718" r:id="rId8"/>
+    <p:sldLayoutId id="2147483719" r:id="rId9"/>
+    <p:sldLayoutId id="2147483720" r:id="rId10"/>
+    <p:sldLayoutId id="2147483721" r:id="rId11"/>
   </p:sldLayoutIdLst>
   <p:txStyles>
     <p:titleStyle>
-      <a:lvl1pPr algn="l" defTabSz="1280160" rtl="0" eaLnBrk="1" latinLnBrk="0" hangingPunct="1">
+      <a:lvl1pPr algn="l" defTabSz="960120" rtl="0" eaLnBrk="1" latinLnBrk="0" hangingPunct="1">
         <a:lnSpc>
           <a:spcPct val="90000"/>
         </a:lnSpc>
@@ -2918,7 +3279,7 @@
           <a:spcPct val="0"/>
         </a:spcBef>
         <a:buNone/>
-        <a:defRPr sz="6160" kern="1200">
+        <a:defRPr sz="4620" kern="1200">
           <a:solidFill>
             <a:schemeClr val="tx1"/>
           </a:solidFill>
@@ -2929,16 +3290,16 @@
       </a:lvl1pPr>
     </p:titleStyle>
     <p:bodyStyle>
-      <a:lvl1pPr marL="320040" indent="-320040" algn="l" defTabSz="1280160" rtl="0" eaLnBrk="1" latinLnBrk="0" hangingPunct="1">
+      <a:lvl1pPr marL="240030" indent="-240030" algn="l" defTabSz="960120" rtl="0" eaLnBrk="1" latinLnBrk="0" hangingPunct="1">
         <a:lnSpc>
           <a:spcPct val="90000"/>
         </a:lnSpc>
         <a:spcBef>
-          <a:spcPts val="1400"/>
+          <a:spcPts val="1050"/>
         </a:spcBef>
         <a:buFont typeface="Arial" panose="020B0604020202020204" pitchFamily="34" charset="0"/>
         <a:buChar char="•"/>
-        <a:defRPr sz="3920" kern="1200">
+        <a:defRPr sz="2940" kern="1200">
           <a:solidFill>
             <a:schemeClr val="tx1"/>
           </a:solidFill>
@@ -2947,48 +3308,12 @@
           <a:cs typeface="+mn-cs"/>
         </a:defRPr>
       </a:lvl1pPr>
-      <a:lvl2pPr marL="960120" indent="-320040" algn="l" defTabSz="1280160" rtl="0" eaLnBrk="1" latinLnBrk="0" hangingPunct="1">
+      <a:lvl2pPr marL="720090" indent="-240030" algn="l" defTabSz="960120" rtl="0" eaLnBrk="1" latinLnBrk="0" hangingPunct="1">
         <a:lnSpc>
           <a:spcPct val="90000"/>
         </a:lnSpc>
         <a:spcBef>
-          <a:spcPts val="700"/>
-        </a:spcBef>
-        <a:buFont typeface="Arial" panose="020B0604020202020204" pitchFamily="34" charset="0"/>
-        <a:buChar char="•"/>
-        <a:defRPr sz="3360" kern="1200">
-          <a:solidFill>
-            <a:schemeClr val="tx1"/>
-          </a:solidFill>
-          <a:latin typeface="+mn-lt"/>
-          <a:ea typeface="+mn-ea"/>
-          <a:cs typeface="+mn-cs"/>
-        </a:defRPr>
-      </a:lvl2pPr>
-      <a:lvl3pPr marL="1600200" indent="-320040" algn="l" defTabSz="1280160" rtl="0" eaLnBrk="1" latinLnBrk="0" hangingPunct="1">
-        <a:lnSpc>
-          <a:spcPct val="90000"/>
-        </a:lnSpc>
-        <a:spcBef>
-          <a:spcPts val="700"/>
-        </a:spcBef>
-        <a:buFont typeface="Arial" panose="020B0604020202020204" pitchFamily="34" charset="0"/>
-        <a:buChar char="•"/>
-        <a:defRPr sz="2800" kern="1200">
-          <a:solidFill>
-            <a:schemeClr val="tx1"/>
-          </a:solidFill>
-          <a:latin typeface="+mn-lt"/>
-          <a:ea typeface="+mn-ea"/>
-          <a:cs typeface="+mn-cs"/>
-        </a:defRPr>
-      </a:lvl3pPr>
-      <a:lvl4pPr marL="2240280" indent="-320040" algn="l" defTabSz="1280160" rtl="0" eaLnBrk="1" latinLnBrk="0" hangingPunct="1">
-        <a:lnSpc>
-          <a:spcPct val="90000"/>
-        </a:lnSpc>
-        <a:spcBef>
-          <a:spcPts val="700"/>
+          <a:spcPts val="525"/>
         </a:spcBef>
         <a:buFont typeface="Arial" panose="020B0604020202020204" pitchFamily="34" charset="0"/>
         <a:buChar char="•"/>
@@ -3000,17 +3325,53 @@
           <a:ea typeface="+mn-ea"/>
           <a:cs typeface="+mn-cs"/>
         </a:defRPr>
-      </a:lvl4pPr>
-      <a:lvl5pPr marL="2880360" indent="-320040" algn="l" defTabSz="1280160" rtl="0" eaLnBrk="1" latinLnBrk="0" hangingPunct="1">
+      </a:lvl2pPr>
+      <a:lvl3pPr marL="1200150" indent="-240030" algn="l" defTabSz="960120" rtl="0" eaLnBrk="1" latinLnBrk="0" hangingPunct="1">
         <a:lnSpc>
           <a:spcPct val="90000"/>
         </a:lnSpc>
         <a:spcBef>
-          <a:spcPts val="700"/>
+          <a:spcPts val="525"/>
         </a:spcBef>
         <a:buFont typeface="Arial" panose="020B0604020202020204" pitchFamily="34" charset="0"/>
         <a:buChar char="•"/>
-        <a:defRPr sz="2520" kern="1200">
+        <a:defRPr sz="2100" kern="1200">
+          <a:solidFill>
+            <a:schemeClr val="tx1"/>
+          </a:solidFill>
+          <a:latin typeface="+mn-lt"/>
+          <a:ea typeface="+mn-ea"/>
+          <a:cs typeface="+mn-cs"/>
+        </a:defRPr>
+      </a:lvl3pPr>
+      <a:lvl4pPr marL="1680210" indent="-240030" algn="l" defTabSz="960120" rtl="0" eaLnBrk="1" latinLnBrk="0" hangingPunct="1">
+        <a:lnSpc>
+          <a:spcPct val="90000"/>
+        </a:lnSpc>
+        <a:spcBef>
+          <a:spcPts val="525"/>
+        </a:spcBef>
+        <a:buFont typeface="Arial" panose="020B0604020202020204" pitchFamily="34" charset="0"/>
+        <a:buChar char="•"/>
+        <a:defRPr sz="1890" kern="1200">
+          <a:solidFill>
+            <a:schemeClr val="tx1"/>
+          </a:solidFill>
+          <a:latin typeface="+mn-lt"/>
+          <a:ea typeface="+mn-ea"/>
+          <a:cs typeface="+mn-cs"/>
+        </a:defRPr>
+      </a:lvl4pPr>
+      <a:lvl5pPr marL="2160270" indent="-240030" algn="l" defTabSz="960120" rtl="0" eaLnBrk="1" latinLnBrk="0" hangingPunct="1">
+        <a:lnSpc>
+          <a:spcPct val="90000"/>
+        </a:lnSpc>
+        <a:spcBef>
+          <a:spcPts val="525"/>
+        </a:spcBef>
+        <a:buFont typeface="Arial" panose="020B0604020202020204" pitchFamily="34" charset="0"/>
+        <a:buChar char="•"/>
+        <a:defRPr sz="1890" kern="1200">
           <a:solidFill>
             <a:schemeClr val="tx1"/>
           </a:solidFill>
@@ -3019,16 +3380,16 @@
           <a:cs typeface="+mn-cs"/>
         </a:defRPr>
       </a:lvl5pPr>
-      <a:lvl6pPr marL="3520440" indent="-320040" algn="l" defTabSz="1280160" rtl="0" eaLnBrk="1" latinLnBrk="0" hangingPunct="1">
+      <a:lvl6pPr marL="2640330" indent="-240030" algn="l" defTabSz="960120" rtl="0" eaLnBrk="1" latinLnBrk="0" hangingPunct="1">
         <a:lnSpc>
           <a:spcPct val="90000"/>
         </a:lnSpc>
         <a:spcBef>
-          <a:spcPts val="700"/>
+          <a:spcPts val="525"/>
         </a:spcBef>
         <a:buFont typeface="Arial" panose="020B0604020202020204" pitchFamily="34" charset="0"/>
         <a:buChar char="•"/>
-        <a:defRPr sz="2520" kern="1200">
+        <a:defRPr sz="1890" kern="1200">
           <a:solidFill>
             <a:schemeClr val="tx1"/>
           </a:solidFill>
@@ -3037,16 +3398,16 @@
           <a:cs typeface="+mn-cs"/>
         </a:defRPr>
       </a:lvl6pPr>
-      <a:lvl7pPr marL="4160520" indent="-320040" algn="l" defTabSz="1280160" rtl="0" eaLnBrk="1" latinLnBrk="0" hangingPunct="1">
+      <a:lvl7pPr marL="3120390" indent="-240030" algn="l" defTabSz="960120" rtl="0" eaLnBrk="1" latinLnBrk="0" hangingPunct="1">
         <a:lnSpc>
           <a:spcPct val="90000"/>
         </a:lnSpc>
         <a:spcBef>
-          <a:spcPts val="700"/>
+          <a:spcPts val="525"/>
         </a:spcBef>
         <a:buFont typeface="Arial" panose="020B0604020202020204" pitchFamily="34" charset="0"/>
         <a:buChar char="•"/>
-        <a:defRPr sz="2520" kern="1200">
+        <a:defRPr sz="1890" kern="1200">
           <a:solidFill>
             <a:schemeClr val="tx1"/>
           </a:solidFill>
@@ -3055,16 +3416,16 @@
           <a:cs typeface="+mn-cs"/>
         </a:defRPr>
       </a:lvl7pPr>
-      <a:lvl8pPr marL="4800600" indent="-320040" algn="l" defTabSz="1280160" rtl="0" eaLnBrk="1" latinLnBrk="0" hangingPunct="1">
+      <a:lvl8pPr marL="3600450" indent="-240030" algn="l" defTabSz="960120" rtl="0" eaLnBrk="1" latinLnBrk="0" hangingPunct="1">
         <a:lnSpc>
           <a:spcPct val="90000"/>
         </a:lnSpc>
         <a:spcBef>
-          <a:spcPts val="700"/>
+          <a:spcPts val="525"/>
         </a:spcBef>
         <a:buFont typeface="Arial" panose="020B0604020202020204" pitchFamily="34" charset="0"/>
         <a:buChar char="•"/>
-        <a:defRPr sz="2520" kern="1200">
+        <a:defRPr sz="1890" kern="1200">
           <a:solidFill>
             <a:schemeClr val="tx1"/>
           </a:solidFill>
@@ -3073,16 +3434,16 @@
           <a:cs typeface="+mn-cs"/>
         </a:defRPr>
       </a:lvl8pPr>
-      <a:lvl9pPr marL="5440680" indent="-320040" algn="l" defTabSz="1280160" rtl="0" eaLnBrk="1" latinLnBrk="0" hangingPunct="1">
+      <a:lvl9pPr marL="4080510" indent="-240030" algn="l" defTabSz="960120" rtl="0" eaLnBrk="1" latinLnBrk="0" hangingPunct="1">
         <a:lnSpc>
           <a:spcPct val="90000"/>
         </a:lnSpc>
         <a:spcBef>
-          <a:spcPts val="700"/>
+          <a:spcPts val="525"/>
         </a:spcBef>
         <a:buFont typeface="Arial" panose="020B0604020202020204" pitchFamily="34" charset="0"/>
         <a:buChar char="•"/>
-        <a:defRPr sz="2520" kern="1200">
+        <a:defRPr sz="1890" kern="1200">
           <a:solidFill>
             <a:schemeClr val="tx1"/>
           </a:solidFill>
@@ -3094,10 +3455,10 @@
     </p:bodyStyle>
     <p:otherStyle>
       <a:defPPr>
-        <a:defRPr lang="en-US"/>
+        <a:defRPr lang="nl-NL"/>
       </a:defPPr>
-      <a:lvl1pPr marL="0" algn="l" defTabSz="1280160" rtl="0" eaLnBrk="1" latinLnBrk="0" hangingPunct="1">
-        <a:defRPr sz="2520" kern="1200">
+      <a:lvl1pPr marL="0" algn="l" defTabSz="960120" rtl="0" eaLnBrk="1" latinLnBrk="0" hangingPunct="1">
+        <a:defRPr sz="1890" kern="1200">
           <a:solidFill>
             <a:schemeClr val="tx1"/>
           </a:solidFill>
@@ -3106,8 +3467,8 @@
           <a:cs typeface="+mn-cs"/>
         </a:defRPr>
       </a:lvl1pPr>
-      <a:lvl2pPr marL="640080" algn="l" defTabSz="1280160" rtl="0" eaLnBrk="1" latinLnBrk="0" hangingPunct="1">
-        <a:defRPr sz="2520" kern="1200">
+      <a:lvl2pPr marL="480060" algn="l" defTabSz="960120" rtl="0" eaLnBrk="1" latinLnBrk="0" hangingPunct="1">
+        <a:defRPr sz="1890" kern="1200">
           <a:solidFill>
             <a:schemeClr val="tx1"/>
           </a:solidFill>
@@ -3116,8 +3477,8 @@
           <a:cs typeface="+mn-cs"/>
         </a:defRPr>
       </a:lvl2pPr>
-      <a:lvl3pPr marL="1280160" algn="l" defTabSz="1280160" rtl="0" eaLnBrk="1" latinLnBrk="0" hangingPunct="1">
-        <a:defRPr sz="2520" kern="1200">
+      <a:lvl3pPr marL="960120" algn="l" defTabSz="960120" rtl="0" eaLnBrk="1" latinLnBrk="0" hangingPunct="1">
+        <a:defRPr sz="1890" kern="1200">
           <a:solidFill>
             <a:schemeClr val="tx1"/>
           </a:solidFill>
@@ -3126,8 +3487,8 @@
           <a:cs typeface="+mn-cs"/>
         </a:defRPr>
       </a:lvl3pPr>
-      <a:lvl4pPr marL="1920240" algn="l" defTabSz="1280160" rtl="0" eaLnBrk="1" latinLnBrk="0" hangingPunct="1">
-        <a:defRPr sz="2520" kern="1200">
+      <a:lvl4pPr marL="1440180" algn="l" defTabSz="960120" rtl="0" eaLnBrk="1" latinLnBrk="0" hangingPunct="1">
+        <a:defRPr sz="1890" kern="1200">
           <a:solidFill>
             <a:schemeClr val="tx1"/>
           </a:solidFill>
@@ -3136,8 +3497,8 @@
           <a:cs typeface="+mn-cs"/>
         </a:defRPr>
       </a:lvl4pPr>
-      <a:lvl5pPr marL="2560320" algn="l" defTabSz="1280160" rtl="0" eaLnBrk="1" latinLnBrk="0" hangingPunct="1">
-        <a:defRPr sz="2520" kern="1200">
+      <a:lvl5pPr marL="1920240" algn="l" defTabSz="960120" rtl="0" eaLnBrk="1" latinLnBrk="0" hangingPunct="1">
+        <a:defRPr sz="1890" kern="1200">
           <a:solidFill>
             <a:schemeClr val="tx1"/>
           </a:solidFill>
@@ -3146,8 +3507,8 @@
           <a:cs typeface="+mn-cs"/>
         </a:defRPr>
       </a:lvl5pPr>
-      <a:lvl6pPr marL="3200400" algn="l" defTabSz="1280160" rtl="0" eaLnBrk="1" latinLnBrk="0" hangingPunct="1">
-        <a:defRPr sz="2520" kern="1200">
+      <a:lvl6pPr marL="2400300" algn="l" defTabSz="960120" rtl="0" eaLnBrk="1" latinLnBrk="0" hangingPunct="1">
+        <a:defRPr sz="1890" kern="1200">
           <a:solidFill>
             <a:schemeClr val="tx1"/>
           </a:solidFill>
@@ -3156,8 +3517,8 @@
           <a:cs typeface="+mn-cs"/>
         </a:defRPr>
       </a:lvl6pPr>
-      <a:lvl7pPr marL="3840480" algn="l" defTabSz="1280160" rtl="0" eaLnBrk="1" latinLnBrk="0" hangingPunct="1">
-        <a:defRPr sz="2520" kern="1200">
+      <a:lvl7pPr marL="2880360" algn="l" defTabSz="960120" rtl="0" eaLnBrk="1" latinLnBrk="0" hangingPunct="1">
+        <a:defRPr sz="1890" kern="1200">
           <a:solidFill>
             <a:schemeClr val="tx1"/>
           </a:solidFill>
@@ -3166,8 +3527,8 @@
           <a:cs typeface="+mn-cs"/>
         </a:defRPr>
       </a:lvl7pPr>
-      <a:lvl8pPr marL="4480560" algn="l" defTabSz="1280160" rtl="0" eaLnBrk="1" latinLnBrk="0" hangingPunct="1">
-        <a:defRPr sz="2520" kern="1200">
+      <a:lvl8pPr marL="3360420" algn="l" defTabSz="960120" rtl="0" eaLnBrk="1" latinLnBrk="0" hangingPunct="1">
+        <a:defRPr sz="1890" kern="1200">
           <a:solidFill>
             <a:schemeClr val="tx1"/>
           </a:solidFill>
@@ -3176,8 +3537,8 @@
           <a:cs typeface="+mn-cs"/>
         </a:defRPr>
       </a:lvl8pPr>
-      <a:lvl9pPr marL="5120640" algn="l" defTabSz="1280160" rtl="0" eaLnBrk="1" latinLnBrk="0" hangingPunct="1">
-        <a:defRPr sz="2520" kern="1200">
+      <a:lvl9pPr marL="3840480" algn="l" defTabSz="960120" rtl="0" eaLnBrk="1" latinLnBrk="0" hangingPunct="1">
+        <a:defRPr sz="1890" kern="1200">
           <a:solidFill>
             <a:schemeClr val="tx1"/>
           </a:solidFill>
@@ -3210,6 +3571,53 @@
       </p:grpSpPr>
       <p:pic>
         <p:nvPicPr>
+          <p:cNvPr id="4" name="Picture 2" descr="ESP32-C6-DEVKITM-1-N4 ESPRESSIF - Conjunto de arra: IoT | Comp:  ESP32-C6-MINI-1-N4; 3,3VDC,5VDC; ESP32C6-DEVKITM1N4 | TME - Elektroniikka  komponentit México">
+            <a:extLst>
+              <a:ext uri="{FF2B5EF4-FFF2-40B4-BE49-F238E27FC236}">
+                <a16:creationId xmlns:a16="http://schemas.microsoft.com/office/drawing/2014/main" id="{BAA316B4-43B8-D8AB-4545-7580A9C2C4AF}"/>
+              </a:ext>
+            </a:extLst>
+          </p:cNvPr>
+          <p:cNvPicPr>
+            <a:picLocks noChangeAspect="1" noChangeArrowheads="1"/>
+          </p:cNvPicPr>
+          <p:nvPr/>
+        </p:nvPicPr>
+        <p:blipFill>
+          <a:blip r:embed="rId2">
+            <a:extLst>
+              <a:ext uri="{28A0092B-C50C-407E-A947-70E740481C1C}">
+                <a14:useLocalDpi xmlns:a14="http://schemas.microsoft.com/office/drawing/2010/main" val="0"/>
+              </a:ext>
+            </a:extLst>
+          </a:blip>
+          <a:srcRect/>
+          <a:stretch>
+            <a:fillRect/>
+          </a:stretch>
+        </p:blipFill>
+        <p:spPr bwMode="auto">
+          <a:xfrm>
+            <a:off x="2413545" y="5948246"/>
+            <a:ext cx="10388055" cy="7791041"/>
+          </a:xfrm>
+          <a:prstGeom prst="rect">
+            <a:avLst/>
+          </a:prstGeom>
+          <a:noFill/>
+          <a:extLst>
+            <a:ext uri="{909E8E84-426E-40DD-AFC4-6F175D3DCCD1}">
+              <a14:hiddenFill xmlns:a14="http://schemas.microsoft.com/office/drawing/2010/main">
+                <a:solidFill>
+                  <a:srgbClr val="FFFFFF"/>
+                </a:solidFill>
+              </a14:hiddenFill>
+            </a:ext>
+          </a:extLst>
+        </p:spPr>
+      </p:pic>
+      <p:pic>
+        <p:nvPicPr>
           <p:cNvPr id="14" name="Afbeelding 13">
             <a:extLst>
               <a:ext uri="{FF2B5EF4-FFF2-40B4-BE49-F238E27FC236}">
@@ -3223,7 +3631,7 @@
           <p:nvPr/>
         </p:nvPicPr>
         <p:blipFill>
-          <a:blip r:embed="rId2">
+          <a:blip r:embed="rId3">
             <a:extLst>
               <a:ext uri="{28A0092B-C50C-407E-A947-70E740481C1C}">
                 <a14:useLocalDpi xmlns:a14="http://schemas.microsoft.com/office/drawing/2010/main" val="0"/>
@@ -3257,15 +3665,14 @@
           <p:nvPr/>
         </p:nvPicPr>
         <p:blipFill>
-          <a:blip r:embed="rId3"/>
-          <a:stretch>
-            <a:fillRect/>
-          </a:stretch>
+          <a:blip r:embed="rId4"/>
+          <a:srcRect r="2074"/>
+          <a:stretch/>
         </p:blipFill>
         <p:spPr>
           <a:xfrm>
-            <a:off x="-9" y="1976823"/>
-            <a:ext cx="12801609" cy="17222400"/>
+            <a:off x="982163" y="3748029"/>
+            <a:ext cx="10092238" cy="13566024"/>
           </a:xfrm>
           <a:prstGeom prst="rect">
             <a:avLst/>
@@ -3365,7 +3772,7 @@
           <p:nvPr/>
         </p:nvPicPr>
         <p:blipFill>
-          <a:blip r:embed="rId4">
+          <a:blip r:embed="rId5">
             <a:extLst>
               <a:ext uri="{28A0092B-C50C-407E-A947-70E740481C1C}">
                 <a14:useLocalDpi xmlns:a14="http://schemas.microsoft.com/office/drawing/2010/main" val="0"/>
@@ -3401,7 +3808,7 @@
           <p:nvPr/>
         </p:nvPicPr>
         <p:blipFill>
-          <a:blip r:embed="rId5">
+          <a:blip r:embed="rId6">
             <a:extLst>
               <a:ext uri="{28A0092B-C50C-407E-A947-70E740481C1C}">
                 <a14:useLocalDpi xmlns:a14="http://schemas.microsoft.com/office/drawing/2010/main" val="0"/>
@@ -3437,7 +3844,7 @@
           <p:nvPr/>
         </p:nvPicPr>
         <p:blipFill>
-          <a:blip r:embed="rId6">
+          <a:blip r:embed="rId7">
             <a:extLst>
               <a:ext uri="{28A0092B-C50C-407E-A947-70E740481C1C}">
                 <a14:useLocalDpi xmlns:a14="http://schemas.microsoft.com/office/drawing/2010/main" val="0"/>
@@ -3473,7 +3880,7 @@
           <p:nvPr/>
         </p:nvPicPr>
         <p:blipFill>
-          <a:blip r:embed="rId7">
+          <a:blip r:embed="rId8">
             <a:extLst>
               <a:ext uri="{28A0092B-C50C-407E-A947-70E740481C1C}">
                 <a14:useLocalDpi xmlns:a14="http://schemas.microsoft.com/office/drawing/2010/main" val="0"/>
@@ -3486,8 +3893,8 @@
           </a:stretch>
         </p:blipFill>
         <p:spPr bwMode="auto">
-          <a:xfrm rot="16200000">
-            <a:off x="-951036" y="4699065"/>
+          <a:xfrm rot="12971008" flipV="1">
+            <a:off x="123274" y="15802784"/>
             <a:ext cx="3445200" cy="1543128"/>
           </a:xfrm>
           <a:prstGeom prst="rect">
@@ -3521,7 +3928,7 @@
 <file path=ppt/theme/theme1.xml><?xml version="1.0" encoding="utf-8"?>
 <a:theme xmlns:a="http://schemas.openxmlformats.org/drawingml/2006/main" name="Kantoorthema">
   <a:themeElements>
-    <a:clrScheme name="Kantoorthema">
+    <a:clrScheme name="Office">
       <a:dk1>
         <a:sysClr val="windowText" lastClr="000000"/>
       </a:dk1>
@@ -3559,7 +3966,7 @@
         <a:srgbClr val="96607D"/>
       </a:folHlink>
     </a:clrScheme>
-    <a:fontScheme name="Kantoorthema">
+    <a:fontScheme name="Office">
       <a:majorFont>
         <a:latin typeface="Aptos Display" panose="02110004020202020204"/>
         <a:ea typeface=""/>
@@ -3665,7 +4072,7 @@
         <a:font script="Tfng" typeface="Ebrima"/>
       </a:minorFont>
     </a:fontScheme>
-    <a:fmtScheme name="Kantoorthema">
+    <a:fmtScheme name="Office">
       <a:fillStyleLst>
         <a:solidFill>
           <a:schemeClr val="phClr"/>

</xml_diff>